<commit_message>
added lab 2 worksheet solution. made changes to jaccard similarity examples and code snippet in slideshow
</commit_message>
<xml_diff>
--- a/lab 2 - DS and Distance_Similarity.pptx
+++ b/lab 2 - DS and Distance_Similarity.pptx
@@ -4,6 +4,9 @@
   <p:sldMasterIdLst>
     <p:sldMasterId id="2147483660" r:id="rId1"/>
   </p:sldMasterIdLst>
+  <p:notesMasterIdLst>
+    <p:notesMasterId r:id="rId44"/>
+  </p:notesMasterIdLst>
   <p:sldIdLst>
     <p:sldId id="256" r:id="rId2"/>
     <p:sldId id="288" r:id="rId3"/>
@@ -34,8 +37,8 @@
     <p:sldId id="269" r:id="rId28"/>
     <p:sldId id="270" r:id="rId29"/>
     <p:sldId id="272" r:id="rId30"/>
-    <p:sldId id="286" r:id="rId31"/>
-    <p:sldId id="273" r:id="rId32"/>
+    <p:sldId id="303" r:id="rId31"/>
+    <p:sldId id="302" r:id="rId32"/>
     <p:sldId id="276" r:id="rId33"/>
     <p:sldId id="277" r:id="rId34"/>
     <p:sldId id="291" r:id="rId35"/>
@@ -51,7 +54,7 @@
   <p:sldSz cx="12192000" cy="6858000"/>
   <p:notesSz cx="6858000" cy="9144000"/>
   <p:custDataLst>
-    <p:tags r:id="rId44"/>
+    <p:tags r:id="rId45"/>
   </p:custDataLst>
   <p:defaultTextStyle>
     <a:defPPr marR="0" lvl="0" algn="l" rtl="0">
@@ -288,6 +291,547 @@
     </p:ext>
   </p:extLst>
 </p:presentation>
+</file>
+
+<file path=ppt/notesMasters/notesMaster1.xml><?xml version="1.0" encoding="utf-8"?>
+<p:notesMaster xmlns:a="http://schemas.openxmlformats.org/drawingml/2006/main" xmlns:r="http://schemas.openxmlformats.org/officeDocument/2006/relationships" xmlns:p="http://schemas.openxmlformats.org/presentationml/2006/main">
+  <p:cSld>
+    <p:bg>
+      <p:bgRef idx="1001">
+        <a:schemeClr val="bg1"/>
+      </p:bgRef>
+    </p:bg>
+    <p:spTree>
+      <p:nvGrpSpPr>
+        <p:cNvPr id="1" name=""/>
+        <p:cNvGrpSpPr/>
+        <p:nvPr/>
+      </p:nvGrpSpPr>
+      <p:grpSpPr>
+        <a:xfrm>
+          <a:off x="0" y="0"/>
+          <a:ext cx="0" cy="0"/>
+          <a:chOff x="0" y="0"/>
+          <a:chExt cx="0" cy="0"/>
+        </a:xfrm>
+      </p:grpSpPr>
+      <p:sp>
+        <p:nvSpPr>
+          <p:cNvPr id="2" name="Header Placeholder 1"/>
+          <p:cNvSpPr>
+            <a:spLocks noGrp="1"/>
+          </p:cNvSpPr>
+          <p:nvPr>
+            <p:ph type="hdr" sz="quarter"/>
+          </p:nvPr>
+        </p:nvSpPr>
+        <p:spPr>
+          <a:xfrm>
+            <a:off x="0" y="0"/>
+            <a:ext cx="2971800" cy="458788"/>
+          </a:xfrm>
+          <a:prstGeom prst="rect">
+            <a:avLst/>
+          </a:prstGeom>
+        </p:spPr>
+        <p:txBody>
+          <a:bodyPr vert="horz" lIns="91440" tIns="45720" rIns="91440" bIns="45720" rtlCol="0"/>
+          <a:lstStyle>
+            <a:lvl1pPr algn="l">
+              <a:defRPr sz="1200"/>
+            </a:lvl1pPr>
+          </a:lstStyle>
+          <a:p>
+            <a:endParaRPr lang="en-US"/>
+          </a:p>
+        </p:txBody>
+      </p:sp>
+      <p:sp>
+        <p:nvSpPr>
+          <p:cNvPr id="3" name="Date Placeholder 2"/>
+          <p:cNvSpPr>
+            <a:spLocks noGrp="1"/>
+          </p:cNvSpPr>
+          <p:nvPr>
+            <p:ph type="dt" idx="1"/>
+          </p:nvPr>
+        </p:nvSpPr>
+        <p:spPr>
+          <a:xfrm>
+            <a:off x="3884613" y="0"/>
+            <a:ext cx="2971800" cy="458788"/>
+          </a:xfrm>
+          <a:prstGeom prst="rect">
+            <a:avLst/>
+          </a:prstGeom>
+        </p:spPr>
+        <p:txBody>
+          <a:bodyPr vert="horz" lIns="91440" tIns="45720" rIns="91440" bIns="45720" rtlCol="0"/>
+          <a:lstStyle>
+            <a:lvl1pPr algn="r">
+              <a:defRPr sz="1200"/>
+            </a:lvl1pPr>
+          </a:lstStyle>
+          <a:p>
+            <a:fld id="{5D4CF9B4-CEB0-0242-9FB1-E948A94E9056}" type="datetimeFigureOut">
+              <a:rPr lang="en-US" smtClean="0"/>
+              <a:t>2/4/26</a:t>
+            </a:fld>
+            <a:endParaRPr lang="en-US"/>
+          </a:p>
+        </p:txBody>
+      </p:sp>
+      <p:sp>
+        <p:nvSpPr>
+          <p:cNvPr id="4" name="Slide Image Placeholder 3"/>
+          <p:cNvSpPr>
+            <a:spLocks noGrp="1" noRot="1" noChangeAspect="1"/>
+          </p:cNvSpPr>
+          <p:nvPr>
+            <p:ph type="sldImg" idx="2"/>
+          </p:nvPr>
+        </p:nvSpPr>
+        <p:spPr>
+          <a:xfrm>
+            <a:off x="685800" y="1143000"/>
+            <a:ext cx="5486400" cy="3086100"/>
+          </a:xfrm>
+          <a:prstGeom prst="rect">
+            <a:avLst/>
+          </a:prstGeom>
+          <a:noFill/>
+          <a:ln w="12700">
+            <a:solidFill>
+              <a:prstClr val="black"/>
+            </a:solidFill>
+          </a:ln>
+        </p:spPr>
+        <p:txBody>
+          <a:bodyPr vert="horz" lIns="91440" tIns="45720" rIns="91440" bIns="45720" rtlCol="0" anchor="ctr"/>
+          <a:lstStyle/>
+          <a:p>
+            <a:endParaRPr lang="en-US"/>
+          </a:p>
+        </p:txBody>
+      </p:sp>
+      <p:sp>
+        <p:nvSpPr>
+          <p:cNvPr id="5" name="Notes Placeholder 4"/>
+          <p:cNvSpPr>
+            <a:spLocks noGrp="1"/>
+          </p:cNvSpPr>
+          <p:nvPr>
+            <p:ph type="body" sz="quarter" idx="3"/>
+          </p:nvPr>
+        </p:nvSpPr>
+        <p:spPr>
+          <a:xfrm>
+            <a:off x="685800" y="4400550"/>
+            <a:ext cx="5486400" cy="3600450"/>
+          </a:xfrm>
+          <a:prstGeom prst="rect">
+            <a:avLst/>
+          </a:prstGeom>
+        </p:spPr>
+        <p:txBody>
+          <a:bodyPr vert="horz" lIns="91440" tIns="45720" rIns="91440" bIns="45720" rtlCol="0"/>
+          <a:lstStyle/>
+          <a:p>
+            <a:pPr lvl="0"/>
+            <a:r>
+              <a:rPr lang="en-US"/>
+              <a:t>Click to edit Master text styles</a:t>
+            </a:r>
+          </a:p>
+          <a:p>
+            <a:pPr lvl="1"/>
+            <a:r>
+              <a:rPr lang="en-US"/>
+              <a:t>Second level</a:t>
+            </a:r>
+          </a:p>
+          <a:p>
+            <a:pPr lvl="2"/>
+            <a:r>
+              <a:rPr lang="en-US"/>
+              <a:t>Third level</a:t>
+            </a:r>
+          </a:p>
+          <a:p>
+            <a:pPr lvl="3"/>
+            <a:r>
+              <a:rPr lang="en-US"/>
+              <a:t>Fourth level</a:t>
+            </a:r>
+          </a:p>
+          <a:p>
+            <a:pPr lvl="4"/>
+            <a:r>
+              <a:rPr lang="en-US"/>
+              <a:t>Fifth level</a:t>
+            </a:r>
+          </a:p>
+        </p:txBody>
+      </p:sp>
+      <p:sp>
+        <p:nvSpPr>
+          <p:cNvPr id="6" name="Footer Placeholder 5"/>
+          <p:cNvSpPr>
+            <a:spLocks noGrp="1"/>
+          </p:cNvSpPr>
+          <p:nvPr>
+            <p:ph type="ftr" sz="quarter" idx="4"/>
+          </p:nvPr>
+        </p:nvSpPr>
+        <p:spPr>
+          <a:xfrm>
+            <a:off x="0" y="8685213"/>
+            <a:ext cx="2971800" cy="458787"/>
+          </a:xfrm>
+          <a:prstGeom prst="rect">
+            <a:avLst/>
+          </a:prstGeom>
+        </p:spPr>
+        <p:txBody>
+          <a:bodyPr vert="horz" lIns="91440" tIns="45720" rIns="91440" bIns="45720" rtlCol="0" anchor="b"/>
+          <a:lstStyle>
+            <a:lvl1pPr algn="l">
+              <a:defRPr sz="1200"/>
+            </a:lvl1pPr>
+          </a:lstStyle>
+          <a:p>
+            <a:endParaRPr lang="en-US"/>
+          </a:p>
+        </p:txBody>
+      </p:sp>
+      <p:sp>
+        <p:nvSpPr>
+          <p:cNvPr id="7" name="Slide Number Placeholder 6"/>
+          <p:cNvSpPr>
+            <a:spLocks noGrp="1"/>
+          </p:cNvSpPr>
+          <p:nvPr>
+            <p:ph type="sldNum" sz="quarter" idx="5"/>
+          </p:nvPr>
+        </p:nvSpPr>
+        <p:spPr>
+          <a:xfrm>
+            <a:off x="3884613" y="8685213"/>
+            <a:ext cx="2971800" cy="458787"/>
+          </a:xfrm>
+          <a:prstGeom prst="rect">
+            <a:avLst/>
+          </a:prstGeom>
+        </p:spPr>
+        <p:txBody>
+          <a:bodyPr vert="horz" lIns="91440" tIns="45720" rIns="91440" bIns="45720" rtlCol="0" anchor="b"/>
+          <a:lstStyle>
+            <a:lvl1pPr algn="r">
+              <a:defRPr sz="1200"/>
+            </a:lvl1pPr>
+          </a:lstStyle>
+          <a:p>
+            <a:fld id="{0E36D66F-E5E1-3142-BD38-1FBFF95EDDBB}" type="slidenum">
+              <a:rPr lang="en-US" smtClean="0"/>
+              <a:t>‹#›</a:t>
+            </a:fld>
+            <a:endParaRPr lang="en-US"/>
+          </a:p>
+        </p:txBody>
+      </p:sp>
+    </p:spTree>
+    <p:extLst>
+      <p:ext uri="{BB962C8B-B14F-4D97-AF65-F5344CB8AC3E}">
+        <p14:creationId xmlns:p14="http://schemas.microsoft.com/office/powerpoint/2010/main" val="3373421345"/>
+      </p:ext>
+    </p:extLst>
+  </p:cSld>
+  <p:clrMap bg1="lt1" tx1="dk1" bg2="lt2" tx2="dk2" accent1="accent1" accent2="accent2" accent3="accent3" accent4="accent4" accent5="accent5" accent6="accent6" hlink="hlink" folHlink="folHlink"/>
+  <p:notesStyle>
+    <a:lvl1pPr marL="0" algn="l" defTabSz="914400" rtl="0" eaLnBrk="1" latinLnBrk="0" hangingPunct="1">
+      <a:defRPr sz="1200" kern="1200">
+        <a:solidFill>
+          <a:schemeClr val="tx1"/>
+        </a:solidFill>
+        <a:latin typeface="+mn-lt"/>
+        <a:ea typeface="+mn-ea"/>
+        <a:cs typeface="+mn-cs"/>
+      </a:defRPr>
+    </a:lvl1pPr>
+    <a:lvl2pPr marL="457200" algn="l" defTabSz="914400" rtl="0" eaLnBrk="1" latinLnBrk="0" hangingPunct="1">
+      <a:defRPr sz="1200" kern="1200">
+        <a:solidFill>
+          <a:schemeClr val="tx1"/>
+        </a:solidFill>
+        <a:latin typeface="+mn-lt"/>
+        <a:ea typeface="+mn-ea"/>
+        <a:cs typeface="+mn-cs"/>
+      </a:defRPr>
+    </a:lvl2pPr>
+    <a:lvl3pPr marL="914400" algn="l" defTabSz="914400" rtl="0" eaLnBrk="1" latinLnBrk="0" hangingPunct="1">
+      <a:defRPr sz="1200" kern="1200">
+        <a:solidFill>
+          <a:schemeClr val="tx1"/>
+        </a:solidFill>
+        <a:latin typeface="+mn-lt"/>
+        <a:ea typeface="+mn-ea"/>
+        <a:cs typeface="+mn-cs"/>
+      </a:defRPr>
+    </a:lvl3pPr>
+    <a:lvl4pPr marL="1371600" algn="l" defTabSz="914400" rtl="0" eaLnBrk="1" latinLnBrk="0" hangingPunct="1">
+      <a:defRPr sz="1200" kern="1200">
+        <a:solidFill>
+          <a:schemeClr val="tx1"/>
+        </a:solidFill>
+        <a:latin typeface="+mn-lt"/>
+        <a:ea typeface="+mn-ea"/>
+        <a:cs typeface="+mn-cs"/>
+      </a:defRPr>
+    </a:lvl4pPr>
+    <a:lvl5pPr marL="1828800" algn="l" defTabSz="914400" rtl="0" eaLnBrk="1" latinLnBrk="0" hangingPunct="1">
+      <a:defRPr sz="1200" kern="1200">
+        <a:solidFill>
+          <a:schemeClr val="tx1"/>
+        </a:solidFill>
+        <a:latin typeface="+mn-lt"/>
+        <a:ea typeface="+mn-ea"/>
+        <a:cs typeface="+mn-cs"/>
+      </a:defRPr>
+    </a:lvl5pPr>
+    <a:lvl6pPr marL="2286000" algn="l" defTabSz="914400" rtl="0" eaLnBrk="1" latinLnBrk="0" hangingPunct="1">
+      <a:defRPr sz="1200" kern="1200">
+        <a:solidFill>
+          <a:schemeClr val="tx1"/>
+        </a:solidFill>
+        <a:latin typeface="+mn-lt"/>
+        <a:ea typeface="+mn-ea"/>
+        <a:cs typeface="+mn-cs"/>
+      </a:defRPr>
+    </a:lvl6pPr>
+    <a:lvl7pPr marL="2743200" algn="l" defTabSz="914400" rtl="0" eaLnBrk="1" latinLnBrk="0" hangingPunct="1">
+      <a:defRPr sz="1200" kern="1200">
+        <a:solidFill>
+          <a:schemeClr val="tx1"/>
+        </a:solidFill>
+        <a:latin typeface="+mn-lt"/>
+        <a:ea typeface="+mn-ea"/>
+        <a:cs typeface="+mn-cs"/>
+      </a:defRPr>
+    </a:lvl7pPr>
+    <a:lvl8pPr marL="3200400" algn="l" defTabSz="914400" rtl="0" eaLnBrk="1" latinLnBrk="0" hangingPunct="1">
+      <a:defRPr sz="1200" kern="1200">
+        <a:solidFill>
+          <a:schemeClr val="tx1"/>
+        </a:solidFill>
+        <a:latin typeface="+mn-lt"/>
+        <a:ea typeface="+mn-ea"/>
+        <a:cs typeface="+mn-cs"/>
+      </a:defRPr>
+    </a:lvl8pPr>
+    <a:lvl9pPr marL="3657600" algn="l" defTabSz="914400" rtl="0" eaLnBrk="1" latinLnBrk="0" hangingPunct="1">
+      <a:defRPr sz="1200" kern="1200">
+        <a:solidFill>
+          <a:schemeClr val="tx1"/>
+        </a:solidFill>
+        <a:latin typeface="+mn-lt"/>
+        <a:ea typeface="+mn-ea"/>
+        <a:cs typeface="+mn-cs"/>
+      </a:defRPr>
+    </a:lvl9pPr>
+  </p:notesStyle>
+</p:notesMaster>
+</file>
+
+<file path=ppt/notesSlides/notesSlide1.xml><?xml version="1.0" encoding="utf-8"?>
+<p:notes xmlns:a="http://schemas.openxmlformats.org/drawingml/2006/main" xmlns:r="http://schemas.openxmlformats.org/officeDocument/2006/relationships" xmlns:p="http://schemas.openxmlformats.org/presentationml/2006/main">
+  <p:cSld>
+    <p:spTree>
+      <p:nvGrpSpPr>
+        <p:cNvPr id="1" name=""/>
+        <p:cNvGrpSpPr/>
+        <p:nvPr/>
+      </p:nvGrpSpPr>
+      <p:grpSpPr>
+        <a:xfrm>
+          <a:off x="0" y="0"/>
+          <a:ext cx="0" cy="0"/>
+          <a:chOff x="0" y="0"/>
+          <a:chExt cx="0" cy="0"/>
+        </a:xfrm>
+      </p:grpSpPr>
+      <p:sp>
+        <p:nvSpPr>
+          <p:cNvPr id="2" name="Slide Image Placeholder 1"/>
+          <p:cNvSpPr>
+            <a:spLocks noGrp="1" noRot="1" noChangeAspect="1"/>
+          </p:cNvSpPr>
+          <p:nvPr>
+            <p:ph type="sldImg"/>
+          </p:nvPr>
+        </p:nvSpPr>
+        <p:spPr/>
+      </p:sp>
+      <p:sp>
+        <p:nvSpPr>
+          <p:cNvPr id="3" name="Notes Placeholder 2"/>
+          <p:cNvSpPr>
+            <a:spLocks noGrp="1"/>
+          </p:cNvSpPr>
+          <p:nvPr>
+            <p:ph type="body" idx="1"/>
+          </p:nvPr>
+        </p:nvSpPr>
+        <p:spPr/>
+        <p:txBody>
+          <a:bodyPr/>
+          <a:lstStyle/>
+          <a:p>
+            <a:endParaRPr lang="en-US" dirty="0"/>
+          </a:p>
+        </p:txBody>
+      </p:sp>
+      <p:sp>
+        <p:nvSpPr>
+          <p:cNvPr id="4" name="Slide Number Placeholder 3"/>
+          <p:cNvSpPr>
+            <a:spLocks noGrp="1"/>
+          </p:cNvSpPr>
+          <p:nvPr>
+            <p:ph type="sldNum" sz="quarter" idx="5"/>
+          </p:nvPr>
+        </p:nvSpPr>
+        <p:spPr/>
+        <p:txBody>
+          <a:bodyPr/>
+          <a:lstStyle/>
+          <a:p>
+            <a:fld id="{0E36D66F-E5E1-3142-BD38-1FBFF95EDDBB}" type="slidenum">
+              <a:rPr lang="en-US" smtClean="0"/>
+              <a:t>29</a:t>
+            </a:fld>
+            <a:endParaRPr lang="en-US"/>
+          </a:p>
+        </p:txBody>
+      </p:sp>
+    </p:spTree>
+    <p:extLst>
+      <p:ext uri="{BB962C8B-B14F-4D97-AF65-F5344CB8AC3E}">
+        <p14:creationId xmlns:p14="http://schemas.microsoft.com/office/powerpoint/2010/main" val="2497976512"/>
+      </p:ext>
+    </p:extLst>
+  </p:cSld>
+  <p:clrMapOvr>
+    <a:masterClrMapping/>
+  </p:clrMapOvr>
+</p:notes>
+</file>
+
+<file path=ppt/notesSlides/notesSlide2.xml><?xml version="1.0" encoding="utf-8"?>
+<p:notes xmlns:a="http://schemas.openxmlformats.org/drawingml/2006/main" xmlns:r="http://schemas.openxmlformats.org/officeDocument/2006/relationships" xmlns:p="http://schemas.openxmlformats.org/presentationml/2006/main">
+  <p:cSld>
+    <p:spTree>
+      <p:nvGrpSpPr>
+        <p:cNvPr id="1" name="">
+          <a:extLst>
+            <a:ext uri="{FF2B5EF4-FFF2-40B4-BE49-F238E27FC236}">
+              <a16:creationId xmlns:a16="http://schemas.microsoft.com/office/drawing/2014/main" id="{6591CA24-B1B7-C44F-447D-E097B9FEC280}"/>
+            </a:ext>
+          </a:extLst>
+        </p:cNvPr>
+        <p:cNvGrpSpPr/>
+        <p:nvPr/>
+      </p:nvGrpSpPr>
+      <p:grpSpPr>
+        <a:xfrm>
+          <a:off x="0" y="0"/>
+          <a:ext cx="0" cy="0"/>
+          <a:chOff x="0" y="0"/>
+          <a:chExt cx="0" cy="0"/>
+        </a:xfrm>
+      </p:grpSpPr>
+      <p:sp>
+        <p:nvSpPr>
+          <p:cNvPr id="2" name="Slide Image Placeholder 1">
+            <a:extLst>
+              <a:ext uri="{FF2B5EF4-FFF2-40B4-BE49-F238E27FC236}">
+                <a16:creationId xmlns:a16="http://schemas.microsoft.com/office/drawing/2014/main" id="{D61E3CD6-3ABF-9144-8D47-901D20E148EC}"/>
+              </a:ext>
+            </a:extLst>
+          </p:cNvPr>
+          <p:cNvSpPr>
+            <a:spLocks noGrp="1" noRot="1" noChangeAspect="1"/>
+          </p:cNvSpPr>
+          <p:nvPr>
+            <p:ph type="sldImg"/>
+          </p:nvPr>
+        </p:nvSpPr>
+        <p:spPr/>
+      </p:sp>
+      <p:sp>
+        <p:nvSpPr>
+          <p:cNvPr id="3" name="Notes Placeholder 2">
+            <a:extLst>
+              <a:ext uri="{FF2B5EF4-FFF2-40B4-BE49-F238E27FC236}">
+                <a16:creationId xmlns:a16="http://schemas.microsoft.com/office/drawing/2014/main" id="{BFFB6089-5597-F09A-388F-B7717DE35B49}"/>
+              </a:ext>
+            </a:extLst>
+          </p:cNvPr>
+          <p:cNvSpPr>
+            <a:spLocks noGrp="1"/>
+          </p:cNvSpPr>
+          <p:nvPr>
+            <p:ph type="body" idx="1"/>
+          </p:nvPr>
+        </p:nvSpPr>
+        <p:spPr/>
+        <p:txBody>
+          <a:bodyPr/>
+          <a:lstStyle/>
+          <a:p>
+            <a:endParaRPr lang="en-US" dirty="0"/>
+          </a:p>
+        </p:txBody>
+      </p:sp>
+      <p:sp>
+        <p:nvSpPr>
+          <p:cNvPr id="4" name="Slide Number Placeholder 3">
+            <a:extLst>
+              <a:ext uri="{FF2B5EF4-FFF2-40B4-BE49-F238E27FC236}">
+                <a16:creationId xmlns:a16="http://schemas.microsoft.com/office/drawing/2014/main" id="{4967EC73-0537-013F-1245-105D7B4FA3D5}"/>
+              </a:ext>
+            </a:extLst>
+          </p:cNvPr>
+          <p:cNvSpPr>
+            <a:spLocks noGrp="1"/>
+          </p:cNvSpPr>
+          <p:nvPr>
+            <p:ph type="sldNum" sz="quarter" idx="5"/>
+          </p:nvPr>
+        </p:nvSpPr>
+        <p:spPr/>
+        <p:txBody>
+          <a:bodyPr/>
+          <a:lstStyle/>
+          <a:p>
+            <a:fld id="{0E36D66F-E5E1-3142-BD38-1FBFF95EDDBB}" type="slidenum">
+              <a:rPr lang="en-US" smtClean="0"/>
+              <a:t>31</a:t>
+            </a:fld>
+            <a:endParaRPr lang="en-US"/>
+          </a:p>
+        </p:txBody>
+      </p:sp>
+    </p:spTree>
+    <p:extLst>
+      <p:ext uri="{BB962C8B-B14F-4D97-AF65-F5344CB8AC3E}">
+        <p14:creationId xmlns:p14="http://schemas.microsoft.com/office/powerpoint/2010/main" val="3681762921"/>
+      </p:ext>
+    </p:extLst>
+  </p:cSld>
+  <p:clrMapOvr>
+    <a:masterClrMapping/>
+  </p:clrMapOvr>
+</p:notes>
 </file>
 
 <file path=ppt/slideLayouts/slideLayout1.xml><?xml version="1.0" encoding="utf-8"?>
@@ -5579,8 +6123,8 @@
           </a:p>
         </p:txBody>
       </p:sp>
-      <mc:AlternateContent xmlns:mc="http://schemas.openxmlformats.org/markup-compatibility/2006">
-        <mc:Choice xmlns:a14="http://schemas.microsoft.com/office/drawing/2010/main" Requires="a14">
+      <mc:AlternateContent xmlns:mc="http://schemas.openxmlformats.org/markup-compatibility/2006" xmlns:a14="http://schemas.microsoft.com/office/drawing/2010/main">
+        <mc:Choice Requires="a14">
           <p:sp>
             <p:nvSpPr>
               <p:cNvPr id="3" name="Text Placeholder 2">
@@ -5809,7 +6353,7 @@
             </p:txBody>
           </p:sp>
         </mc:Choice>
-        <mc:Fallback>
+        <mc:Fallback xmlns="">
           <p:sp>
             <p:nvSpPr>
               <p:cNvPr id="3" name="Text Placeholder 2">
@@ -19771,7 +20315,7 @@
           <a:p>
             <a:r>
               <a:rPr lang="en-US" dirty="0"/>
-              <a:t>How similar are the following images?</a:t>
+              <a:t>How similar are the following users?</a:t>
             </a:r>
           </a:p>
           <a:p>
@@ -19782,8 +20326,8 @@
           </a:p>
         </p:txBody>
       </p:sp>
-      <mc:AlternateContent xmlns:mc="http://schemas.openxmlformats.org/markup-compatibility/2006" xmlns:a14="http://schemas.microsoft.com/office/drawing/2010/main">
-        <mc:Choice Requires="a14">
+      <mc:AlternateContent xmlns:mc="http://schemas.openxmlformats.org/markup-compatibility/2006">
+        <mc:Choice xmlns:a14="http://schemas.microsoft.com/office/drawing/2010/main" Requires="a14">
           <p:graphicFrame>
             <p:nvGraphicFramePr>
               <p:cNvPr id="4" name="Table 3">
@@ -19799,7 +20343,7 @@
               <p:nvPr>
                 <p:extLst>
                   <p:ext uri="{D42A27DB-BD31-4B8C-83A1-F6EECF244321}">
-                    <p14:modId xmlns:p14="http://schemas.microsoft.com/office/powerpoint/2010/main" val="1174242054"/>
+                    <p14:modId xmlns:p14="http://schemas.microsoft.com/office/powerpoint/2010/main" val="2716919120"/>
                   </p:ext>
                 </p:extLst>
               </p:nvPr>
@@ -19868,41 +20412,10 @@
                         <a:lstStyle/>
                         <a:p>
                           <a:pPr/>
-                          <a14:m>
-                            <m:oMathPara xmlns:m="http://schemas.openxmlformats.org/officeDocument/2006/math">
-                              <m:oMathParaPr>
-                                <m:jc m:val="centerGroup"/>
-                              </m:oMathParaPr>
-                              <m:oMath xmlns:m="http://schemas.openxmlformats.org/officeDocument/2006/math">
-                                <m:sSub>
-                                  <m:sSubPr>
-                                    <m:ctrlPr>
-                                      <a:rPr lang="en-US" b="1" i="1" smtClean="0">
-                                        <a:latin typeface="Cambria Math" panose="02040503050406030204" pitchFamily="18" charset="0"/>
-                                      </a:rPr>
-                                    </m:ctrlPr>
-                                  </m:sSubPr>
-                                  <m:e>
-                                    <m:r>
-                                      <a:rPr lang="en-US" b="1" i="1" smtClean="0">
-                                        <a:latin typeface="Cambria Math" panose="02040503050406030204" pitchFamily="18" charset="0"/>
-                                      </a:rPr>
-                                      <m:t>𝒑</m:t>
-                                    </m:r>
-                                  </m:e>
-                                  <m:sub>
-                                    <m:r>
-                                      <a:rPr lang="en-US" b="1" i="1" smtClean="0">
-                                        <a:latin typeface="Cambria Math" panose="02040503050406030204" pitchFamily="18" charset="0"/>
-                                      </a:rPr>
-                                      <m:t>𝟏</m:t>
-                                    </m:r>
-                                  </m:sub>
-                                </m:sSub>
-                              </m:oMath>
-                            </m:oMathPara>
-                          </a14:m>
-                          <a:endParaRPr lang="en-US" b="1" dirty="0"/>
+                          <a:r>
+                            <a:rPr lang="en-US" b="1" dirty="0"/>
+                            <a:t>The Matrix</a:t>
+                          </a:r>
                         </a:p>
                         <a:p>
                           <a:endParaRPr lang="en-US" dirty="0"/>
@@ -19916,41 +20429,10 @@
                         <a:lstStyle/>
                         <a:p>
                           <a:pPr/>
-                          <a14:m>
-                            <m:oMathPara xmlns:m="http://schemas.openxmlformats.org/officeDocument/2006/math">
-                              <m:oMathParaPr>
-                                <m:jc m:val="centerGroup"/>
-                              </m:oMathParaPr>
-                              <m:oMath xmlns:m="http://schemas.openxmlformats.org/officeDocument/2006/math">
-                                <m:sSub>
-                                  <m:sSubPr>
-                                    <m:ctrlPr>
-                                      <a:rPr lang="en-US" b="1" i="1" smtClean="0">
-                                        <a:latin typeface="Cambria Math" panose="02040503050406030204" pitchFamily="18" charset="0"/>
-                                      </a:rPr>
-                                    </m:ctrlPr>
-                                  </m:sSubPr>
-                                  <m:e>
-                                    <m:r>
-                                      <a:rPr lang="en-US" b="1" i="1" smtClean="0">
-                                        <a:latin typeface="Cambria Math" panose="02040503050406030204" pitchFamily="18" charset="0"/>
-                                      </a:rPr>
-                                      <m:t>𝒑</m:t>
-                                    </m:r>
-                                  </m:e>
-                                  <m:sub>
-                                    <m:r>
-                                      <a:rPr lang="en-US" b="1" i="1" smtClean="0">
-                                        <a:latin typeface="Cambria Math" panose="02040503050406030204" pitchFamily="18" charset="0"/>
-                                      </a:rPr>
-                                      <m:t>2</m:t>
-                                    </m:r>
-                                  </m:sub>
-                                </m:sSub>
-                              </m:oMath>
-                            </m:oMathPara>
-                          </a14:m>
-                          <a:endParaRPr lang="en-US" dirty="0"/>
+                          <a:r>
+                            <a:rPr lang="en-US" dirty="0"/>
+                            <a:t>Arrival</a:t>
+                          </a:r>
                         </a:p>
                       </a:txBody>
                       <a:tcPr/>
@@ -19990,41 +20472,10 @@
                         <a:lstStyle/>
                         <a:p>
                           <a:pPr/>
-                          <a14:m>
-                            <m:oMathPara xmlns:m="http://schemas.openxmlformats.org/officeDocument/2006/math">
-                              <m:oMathParaPr>
-                                <m:jc m:val="centerGroup"/>
-                              </m:oMathParaPr>
-                              <m:oMath xmlns:m="http://schemas.openxmlformats.org/officeDocument/2006/math">
-                                <m:sSub>
-                                  <m:sSubPr>
-                                    <m:ctrlPr>
-                                      <a:rPr lang="en-US" b="1" i="1" smtClean="0">
-                                        <a:latin typeface="Cambria Math" panose="02040503050406030204" pitchFamily="18" charset="0"/>
-                                      </a:rPr>
-                                    </m:ctrlPr>
-                                  </m:sSubPr>
-                                  <m:e>
-                                    <m:r>
-                                      <a:rPr lang="en-US" b="1" i="1" smtClean="0">
-                                        <a:latin typeface="Cambria Math" panose="02040503050406030204" pitchFamily="18" charset="0"/>
-                                      </a:rPr>
-                                      <m:t>𝒑</m:t>
-                                    </m:r>
-                                  </m:e>
-                                  <m:sub>
-                                    <m:r>
-                                      <a:rPr lang="en-US" b="1" i="1" smtClean="0">
-                                        <a:latin typeface="Cambria Math" panose="02040503050406030204" pitchFamily="18" charset="0"/>
-                                      </a:rPr>
-                                      <m:t>4</m:t>
-                                    </m:r>
-                                  </m:sub>
-                                </m:sSub>
-                              </m:oMath>
-                            </m:oMathPara>
-                          </a14:m>
-                          <a:endParaRPr lang="en-US" dirty="0"/>
+                          <a:r>
+                            <a:rPr lang="en-US" dirty="0"/>
+                            <a:t>Iron Man</a:t>
+                          </a:r>
                         </a:p>
                       </a:txBody>
                       <a:tcPr/>
@@ -20043,7 +20494,7 @@
                         <a:p>
                           <a:r>
                             <a:rPr lang="en-US" dirty="0"/>
-                            <a:t>Image 1</a:t>
+                            <a:t>User 1</a:t>
                           </a:r>
                         </a:p>
                       </a:txBody>
@@ -20071,7 +20522,7 @@
                           <a:pPr algn="ctr"/>
                           <a:r>
                             <a:rPr lang="en-US" dirty="0"/>
-                            <a:t>1</a:t>
+                            <a:t>0</a:t>
                           </a:r>
                         </a:p>
                       </a:txBody>
@@ -20152,7 +20603,7 @@
                         <a:p>
                           <a:r>
                             <a:rPr lang="en-US" dirty="0"/>
-                            <a:t>Image 2</a:t>
+                            <a:t>User 2</a:t>
                           </a:r>
                         </a:p>
                       </a:txBody>
@@ -20241,7 +20692,7 @@
                           <a:pPr algn="ctr"/>
                           <a:r>
                             <a:rPr lang="en-US" dirty="0"/>
-                            <a:t>0</a:t>
+                            <a:t>1</a:t>
                           </a:r>
                         </a:p>
                       </a:txBody>
@@ -20258,7 +20709,7 @@
             </a:graphic>
           </p:graphicFrame>
         </mc:Choice>
-        <mc:Fallback xmlns="">
+        <mc:Fallback>
           <p:graphicFrame>
             <p:nvGraphicFramePr>
               <p:cNvPr id="4" name="Table 3">
@@ -20274,7 +20725,7 @@
               <p:nvPr>
                 <p:extLst>
                   <p:ext uri="{D42A27DB-BD31-4B8C-83A1-F6EECF244321}">
-                    <p14:modId xmlns:p14="http://schemas.microsoft.com/office/powerpoint/2010/main" val="1174242054"/>
+                    <p14:modId xmlns:p14="http://schemas.microsoft.com/office/powerpoint/2010/main" val="2716919120"/>
                   </p:ext>
                 </p:extLst>
               </p:nvPr>
@@ -20342,34 +20793,31 @@
                         <a:bodyPr/>
                         <a:lstStyle/>
                         <a:p>
-                          <a:endParaRPr lang="en-US"/>
+                          <a:pPr/>
+                          <a:r>
+                            <a:rPr lang="en-US" b="1" dirty="0"/>
+                            <a:t>The Matrix</a:t>
+                          </a:r>
+                        </a:p>
+                        <a:p>
+                          <a:endParaRPr lang="en-US" dirty="0"/>
                         </a:p>
                       </a:txBody>
-                      <a:tcPr>
-                        <a:blipFill>
-                          <a:blip r:embed="rId2"/>
-                          <a:stretch>
-                            <a:fillRect l="-103125" t="-3846" r="-304688" b="-213462"/>
-                          </a:stretch>
-                        </a:blipFill>
-                      </a:tcPr>
+                      <a:tcPr/>
                     </a:tc>
                     <a:tc>
                       <a:txBody>
                         <a:bodyPr/>
                         <a:lstStyle/>
                         <a:p>
-                          <a:endParaRPr lang="en-US"/>
+                          <a:pPr/>
+                          <a:r>
+                            <a:rPr lang="en-US" dirty="0"/>
+                            <a:t>Arrival</a:t>
+                          </a:r>
                         </a:p>
                       </a:txBody>
-                      <a:tcPr>
-                        <a:blipFill>
-                          <a:blip r:embed="rId2"/>
-                          <a:stretch>
-                            <a:fillRect l="-203125" t="-3846" r="-204688" b="-213462"/>
-                          </a:stretch>
-                        </a:blipFill>
-                      </a:tcPr>
+                      <a:tcPr/>
                     </a:tc>
                     <a:tc>
                       <a:txBody>
@@ -20393,17 +20841,14 @@
                         <a:bodyPr/>
                         <a:lstStyle/>
                         <a:p>
-                          <a:endParaRPr lang="en-US"/>
+                          <a:pPr/>
+                          <a:r>
+                            <a:rPr lang="en-US" dirty="0"/>
+                            <a:t>Iron Man</a:t>
+                          </a:r>
                         </a:p>
                       </a:txBody>
-                      <a:tcPr>
-                        <a:blipFill>
-                          <a:blip r:embed="rId2"/>
-                          <a:stretch>
-                            <a:fillRect l="-403125" t="-3846" r="-4688" b="-213462"/>
-                          </a:stretch>
-                        </a:blipFill>
-                      </a:tcPr>
+                      <a:tcPr/>
                     </a:tc>
                     <a:extLst>
                       <a:ext uri="{0D108BD9-81ED-4DB2-BD59-A6C34878D82A}">
@@ -20419,7 +20864,7 @@
                         <a:p>
                           <a:r>
                             <a:rPr lang="en-US" dirty="0"/>
-                            <a:t>Image 1</a:t>
+                            <a:t>User 1</a:t>
                           </a:r>
                         </a:p>
                       </a:txBody>
@@ -20447,7 +20892,7 @@
                           <a:pPr algn="ctr"/>
                           <a:r>
                             <a:rPr lang="en-US" dirty="0"/>
-                            <a:t>1</a:t>
+                            <a:t>0</a:t>
                           </a:r>
                         </a:p>
                       </a:txBody>
@@ -20498,7 +20943,7 @@
                         <a:p>
                           <a:r>
                             <a:rPr lang="en-US" dirty="0"/>
-                            <a:t>Image 2</a:t>
+                            <a:t>User 2</a:t>
                           </a:r>
                         </a:p>
                       </a:txBody>
@@ -20557,7 +21002,7 @@
                           <a:pPr algn="ctr"/>
                           <a:r>
                             <a:rPr lang="en-US" dirty="0"/>
-                            <a:t>0</a:t>
+                            <a:t>1</a:t>
                           </a:r>
                         </a:p>
                       </a:txBody>
@@ -20633,8 +21078,8 @@
           </a:p>
         </p:txBody>
       </p:sp>
-      <mc:AlternateContent xmlns:mc="http://schemas.openxmlformats.org/markup-compatibility/2006" xmlns:a14="http://schemas.microsoft.com/office/drawing/2010/main">
-        <mc:Choice Requires="a14">
+      <mc:AlternateContent xmlns:mc="http://schemas.openxmlformats.org/markup-compatibility/2006">
+        <mc:Choice xmlns:a14="http://schemas.microsoft.com/office/drawing/2010/main" Requires="a14">
           <p:sp>
             <p:nvSpPr>
               <p:cNvPr id="3" name="Text Placeholder 2">
@@ -20778,75 +21223,8 @@
                       <a:rPr lang="en-US" b="0" i="0" smtClean="0">
                         <a:latin typeface="Cambria Math" panose="02040503050406030204" pitchFamily="18" charset="0"/>
                       </a:rPr>
-                      <m:t>=</m:t>
+                      <m:t> </m:t>
                     </m:r>
-                    <m:f>
-                      <m:fPr>
-                        <m:ctrlPr>
-                          <a:rPr lang="en-US" b="0" i="1" smtClean="0">
-                            <a:latin typeface="Cambria Math" panose="02040503050406030204" pitchFamily="18" charset="0"/>
-                          </a:rPr>
-                        </m:ctrlPr>
-                      </m:fPr>
-                      <m:num>
-                        <m:r>
-                          <m:rPr>
-                            <m:nor/>
-                          </m:rPr>
-                          <a:rPr lang="en-US" b="0" i="0" smtClean="0">
-                            <a:latin typeface="Cambria Math" panose="02040503050406030204" pitchFamily="18" charset="0"/>
-                          </a:rPr>
-                          <m:t>total</m:t>
-                        </m:r>
-                        <m:r>
-                          <m:rPr>
-                            <m:nor/>
-                          </m:rPr>
-                          <a:rPr lang="en-US" b="0" i="0" smtClean="0">
-                            <a:latin typeface="Cambria Math" panose="02040503050406030204" pitchFamily="18" charset="0"/>
-                          </a:rPr>
-                          <m:t> # </m:t>
-                        </m:r>
-                        <m:r>
-                          <m:rPr>
-                            <m:nor/>
-                          </m:rPr>
-                          <a:rPr lang="en-US" b="0" i="0" smtClean="0">
-                            <a:latin typeface="Cambria Math" panose="02040503050406030204" pitchFamily="18" charset="0"/>
-                          </a:rPr>
-                          <m:t>matching</m:t>
-                        </m:r>
-                      </m:num>
-                      <m:den>
-                        <m:r>
-                          <m:rPr>
-                            <m:nor/>
-                          </m:rPr>
-                          <a:rPr lang="en-US" b="0" i="0" smtClean="0">
-                            <a:latin typeface="Cambria Math" panose="02040503050406030204" pitchFamily="18" charset="0"/>
-                          </a:rPr>
-                          <m:t>total</m:t>
-                        </m:r>
-                        <m:r>
-                          <m:rPr>
-                            <m:nor/>
-                          </m:rPr>
-                          <a:rPr lang="en-US" b="0" i="0" smtClean="0">
-                            <a:latin typeface="Cambria Math" panose="02040503050406030204" pitchFamily="18" charset="0"/>
-                          </a:rPr>
-                          <m:t> # </m:t>
-                        </m:r>
-                        <m:r>
-                          <m:rPr>
-                            <m:nor/>
-                          </m:rPr>
-                          <a:rPr lang="en-US" b="0" i="0" smtClean="0">
-                            <a:latin typeface="Cambria Math" panose="02040503050406030204" pitchFamily="18" charset="0"/>
-                          </a:rPr>
-                          <m:t>pixels</m:t>
-                        </m:r>
-                      </m:den>
-                    </m:f>
                   </m:oMath>
                 </a14:m>
                 <a:endParaRPr lang="en-US" b="0" dirty="0"/>
@@ -21021,7 +21399,7 @@
             </p:txBody>
           </p:sp>
         </mc:Choice>
-        <mc:Fallback xmlns="">
+        <mc:Fallback>
           <p:sp>
             <p:nvSpPr>
               <p:cNvPr id="3" name="Text Placeholder 2">
@@ -21040,7 +21418,7 @@
             </p:nvSpPr>
             <p:spPr>
               <a:blipFill>
-                <a:blip r:embed="rId2"/>
+                <a:blip r:embed="rId3"/>
                 <a:stretch>
                   <a:fillRect r="-223"/>
                 </a:stretch>
@@ -21061,14 +21439,14 @@
           </p:sp>
         </mc:Fallback>
       </mc:AlternateContent>
-      <mc:AlternateContent xmlns:mc="http://schemas.openxmlformats.org/markup-compatibility/2006" xmlns:a14="http://schemas.microsoft.com/office/drawing/2010/main">
-        <mc:Choice Requires="a14">
+      <mc:AlternateContent xmlns:mc="http://schemas.openxmlformats.org/markup-compatibility/2006">
+        <mc:Choice xmlns:a14="http://schemas.microsoft.com/office/drawing/2010/main" Requires="a14">
           <p:graphicFrame>
             <p:nvGraphicFramePr>
-              <p:cNvPr id="4" name="Table 3">
+              <p:cNvPr id="5" name="Table 4">
                 <a:extLst>
                   <a:ext uri="{FF2B5EF4-FFF2-40B4-BE49-F238E27FC236}">
-                    <a16:creationId xmlns:a16="http://schemas.microsoft.com/office/drawing/2014/main" id="{381B0A8D-3082-C935-FEC1-580EB1D73494}"/>
+                    <a16:creationId xmlns:a16="http://schemas.microsoft.com/office/drawing/2014/main" id="{B0ED35D5-02A5-3223-6213-1CDFCACA65F2}"/>
                   </a:ext>
                 </a:extLst>
               </p:cNvPr>
@@ -21078,13 +21456,13 @@
               <p:nvPr>
                 <p:extLst>
                   <p:ext uri="{D42A27DB-BD31-4B8C-83A1-F6EECF244321}">
-                    <p14:modId xmlns:p14="http://schemas.microsoft.com/office/powerpoint/2010/main" val="448119818"/>
+                    <p14:modId xmlns:p14="http://schemas.microsoft.com/office/powerpoint/2010/main" val="3004801796"/>
                   </p:ext>
                 </p:extLst>
               </p:nvPr>
             </p:nvGraphicFramePr>
             <p:xfrm>
-              <a:off x="2106428" y="2662555"/>
+              <a:off x="2032000" y="2412558"/>
               <a:ext cx="8128000" cy="1981581"/>
             </p:xfrm>
             <a:graphic>
@@ -21147,41 +21525,10 @@
                         <a:lstStyle/>
                         <a:p>
                           <a:pPr/>
-                          <a14:m>
-                            <m:oMathPara xmlns:m="http://schemas.openxmlformats.org/officeDocument/2006/math">
-                              <m:oMathParaPr>
-                                <m:jc m:val="centerGroup"/>
-                              </m:oMathParaPr>
-                              <m:oMath xmlns:m="http://schemas.openxmlformats.org/officeDocument/2006/math">
-                                <m:sSub>
-                                  <m:sSubPr>
-                                    <m:ctrlPr>
-                                      <a:rPr lang="en-US" b="1" i="1" smtClean="0">
-                                        <a:latin typeface="Cambria Math" panose="02040503050406030204" pitchFamily="18" charset="0"/>
-                                      </a:rPr>
-                                    </m:ctrlPr>
-                                  </m:sSubPr>
-                                  <m:e>
-                                    <m:r>
-                                      <a:rPr lang="en-US" b="1" i="1" smtClean="0">
-                                        <a:latin typeface="Cambria Math" panose="02040503050406030204" pitchFamily="18" charset="0"/>
-                                      </a:rPr>
-                                      <m:t>𝒑</m:t>
-                                    </m:r>
-                                  </m:e>
-                                  <m:sub>
-                                    <m:r>
-                                      <a:rPr lang="en-US" b="1" i="1" smtClean="0">
-                                        <a:latin typeface="Cambria Math" panose="02040503050406030204" pitchFamily="18" charset="0"/>
-                                      </a:rPr>
-                                      <m:t>𝟏</m:t>
-                                    </m:r>
-                                  </m:sub>
-                                </m:sSub>
-                              </m:oMath>
-                            </m:oMathPara>
-                          </a14:m>
-                          <a:endParaRPr lang="en-US" b="1" dirty="0"/>
+                          <a:r>
+                            <a:rPr lang="en-US" b="1" dirty="0"/>
+                            <a:t>The Matrix</a:t>
+                          </a:r>
                         </a:p>
                         <a:p>
                           <a:endParaRPr lang="en-US" dirty="0"/>
@@ -21195,41 +21542,10 @@
                         <a:lstStyle/>
                         <a:p>
                           <a:pPr/>
-                          <a14:m>
-                            <m:oMathPara xmlns:m="http://schemas.openxmlformats.org/officeDocument/2006/math">
-                              <m:oMathParaPr>
-                                <m:jc m:val="centerGroup"/>
-                              </m:oMathParaPr>
-                              <m:oMath xmlns:m="http://schemas.openxmlformats.org/officeDocument/2006/math">
-                                <m:sSub>
-                                  <m:sSubPr>
-                                    <m:ctrlPr>
-                                      <a:rPr lang="en-US" b="1" i="1" smtClean="0">
-                                        <a:latin typeface="Cambria Math" panose="02040503050406030204" pitchFamily="18" charset="0"/>
-                                      </a:rPr>
-                                    </m:ctrlPr>
-                                  </m:sSubPr>
-                                  <m:e>
-                                    <m:r>
-                                      <a:rPr lang="en-US" b="1" i="1" smtClean="0">
-                                        <a:latin typeface="Cambria Math" panose="02040503050406030204" pitchFamily="18" charset="0"/>
-                                      </a:rPr>
-                                      <m:t>𝒑</m:t>
-                                    </m:r>
-                                  </m:e>
-                                  <m:sub>
-                                    <m:r>
-                                      <a:rPr lang="en-US" b="1" i="1" smtClean="0">
-                                        <a:latin typeface="Cambria Math" panose="02040503050406030204" pitchFamily="18" charset="0"/>
-                                      </a:rPr>
-                                      <m:t>2</m:t>
-                                    </m:r>
-                                  </m:sub>
-                                </m:sSub>
-                              </m:oMath>
-                            </m:oMathPara>
-                          </a14:m>
-                          <a:endParaRPr lang="en-US" dirty="0"/>
+                          <a:r>
+                            <a:rPr lang="en-US" dirty="0"/>
+                            <a:t>Arrival</a:t>
+                          </a:r>
                         </a:p>
                       </a:txBody>
                       <a:tcPr/>
@@ -21269,41 +21585,10 @@
                         <a:lstStyle/>
                         <a:p>
                           <a:pPr/>
-                          <a14:m>
-                            <m:oMathPara xmlns:m="http://schemas.openxmlformats.org/officeDocument/2006/math">
-                              <m:oMathParaPr>
-                                <m:jc m:val="centerGroup"/>
-                              </m:oMathParaPr>
-                              <m:oMath xmlns:m="http://schemas.openxmlformats.org/officeDocument/2006/math">
-                                <m:sSub>
-                                  <m:sSubPr>
-                                    <m:ctrlPr>
-                                      <a:rPr lang="en-US" b="1" i="1" smtClean="0">
-                                        <a:latin typeface="Cambria Math" panose="02040503050406030204" pitchFamily="18" charset="0"/>
-                                      </a:rPr>
-                                    </m:ctrlPr>
-                                  </m:sSubPr>
-                                  <m:e>
-                                    <m:r>
-                                      <a:rPr lang="en-US" b="1" i="1" smtClean="0">
-                                        <a:latin typeface="Cambria Math" panose="02040503050406030204" pitchFamily="18" charset="0"/>
-                                      </a:rPr>
-                                      <m:t>𝒑</m:t>
-                                    </m:r>
-                                  </m:e>
-                                  <m:sub>
-                                    <m:r>
-                                      <a:rPr lang="en-US" b="1" i="1" smtClean="0">
-                                        <a:latin typeface="Cambria Math" panose="02040503050406030204" pitchFamily="18" charset="0"/>
-                                      </a:rPr>
-                                      <m:t>4</m:t>
-                                    </m:r>
-                                  </m:sub>
-                                </m:sSub>
-                              </m:oMath>
-                            </m:oMathPara>
-                          </a14:m>
-                          <a:endParaRPr lang="en-US" dirty="0"/>
+                          <a:r>
+                            <a:rPr lang="en-US" dirty="0"/>
+                            <a:t>Iron Man</a:t>
+                          </a:r>
                         </a:p>
                       </a:txBody>
                       <a:tcPr/>
@@ -21322,7 +21607,7 @@
                         <a:p>
                           <a:r>
                             <a:rPr lang="en-US" dirty="0"/>
-                            <a:t>Image 1</a:t>
+                            <a:t>User 1</a:t>
                           </a:r>
                         </a:p>
                       </a:txBody>
@@ -21350,7 +21635,7 @@
                           <a:pPr algn="ctr"/>
                           <a:r>
                             <a:rPr lang="en-US" dirty="0"/>
-                            <a:t>1</a:t>
+                            <a:t>0</a:t>
                           </a:r>
                         </a:p>
                       </a:txBody>
@@ -21431,7 +21716,7 @@
                         <a:p>
                           <a:r>
                             <a:rPr lang="en-US" dirty="0"/>
-                            <a:t>Image 2</a:t>
+                            <a:t>User 2</a:t>
                           </a:r>
                         </a:p>
                       </a:txBody>
@@ -21520,7 +21805,7 @@
                           <a:pPr algn="ctr"/>
                           <a:r>
                             <a:rPr lang="en-US" dirty="0"/>
-                            <a:t>0</a:t>
+                            <a:t>1</a:t>
                           </a:r>
                         </a:p>
                       </a:txBody>
@@ -21537,13 +21822,13 @@
             </a:graphic>
           </p:graphicFrame>
         </mc:Choice>
-        <mc:Fallback xmlns="">
+        <mc:Fallback>
           <p:graphicFrame>
             <p:nvGraphicFramePr>
-              <p:cNvPr id="4" name="Table 3">
+              <p:cNvPr id="5" name="Table 4">
                 <a:extLst>
                   <a:ext uri="{FF2B5EF4-FFF2-40B4-BE49-F238E27FC236}">
-                    <a16:creationId xmlns:a16="http://schemas.microsoft.com/office/drawing/2014/main" id="{381B0A8D-3082-C935-FEC1-580EB1D73494}"/>
+                    <a16:creationId xmlns:a16="http://schemas.microsoft.com/office/drawing/2014/main" id="{B0ED35D5-02A5-3223-6213-1CDFCACA65F2}"/>
                   </a:ext>
                 </a:extLst>
               </p:cNvPr>
@@ -21553,13 +21838,13 @@
               <p:nvPr>
                 <p:extLst>
                   <p:ext uri="{D42A27DB-BD31-4B8C-83A1-F6EECF244321}">
-                    <p14:modId xmlns:p14="http://schemas.microsoft.com/office/powerpoint/2010/main" val="448119818"/>
+                    <p14:modId xmlns:p14="http://schemas.microsoft.com/office/powerpoint/2010/main" val="3004801796"/>
                   </p:ext>
                 </p:extLst>
               </p:nvPr>
             </p:nvGraphicFramePr>
             <p:xfrm>
-              <a:off x="2106428" y="2662555"/>
+              <a:off x="2032000" y="2412558"/>
               <a:ext cx="8128000" cy="1981581"/>
             </p:xfrm>
             <a:graphic>
@@ -21621,17 +21906,31 @@
                         <a:bodyPr/>
                         <a:lstStyle/>
                         <a:p>
-                          <a:endParaRPr lang="en-US"/>
+                          <a:pPr/>
+                          <a:r>
+                            <a:rPr lang="en-US" b="1" dirty="0"/>
+                            <a:t>The Matrix</a:t>
+                          </a:r>
+                        </a:p>
+                        <a:p>
+                          <a:endParaRPr lang="en-US" dirty="0"/>
                         </a:p>
                       </a:txBody>
-                      <a:tcPr>
-                        <a:blipFill>
-                          <a:blip r:embed="rId3"/>
-                          <a:stretch>
-                            <a:fillRect l="-102344" t="-3846" r="-305469" b="-213462"/>
-                          </a:stretch>
-                        </a:blipFill>
-                      </a:tcPr>
+                      <a:tcPr/>
+                    </a:tc>
+                    <a:tc>
+                      <a:txBody>
+                        <a:bodyPr/>
+                        <a:lstStyle/>
+                        <a:p>
+                          <a:pPr/>
+                          <a:r>
+                            <a:rPr lang="en-US" dirty="0"/>
+                            <a:t>Arrival</a:t>
+                          </a:r>
+                        </a:p>
+                      </a:txBody>
+                      <a:tcPr/>
                     </a:tc>
                     <a:tc>
                       <a:txBody>
@@ -21643,24 +21942,7 @@
                       </a:txBody>
                       <a:tcPr>
                         <a:blipFill>
-                          <a:blip r:embed="rId3"/>
-                          <a:stretch>
-                            <a:fillRect l="-200775" t="-3846" r="-203101" b="-213462"/>
-                          </a:stretch>
-                        </a:blipFill>
-                      </a:tcPr>
-                    </a:tc>
-                    <a:tc>
-                      <a:txBody>
-                        <a:bodyPr/>
-                        <a:lstStyle/>
-                        <a:p>
-                          <a:endParaRPr lang="en-US"/>
-                        </a:p>
-                      </a:txBody>
-                      <a:tcPr>
-                        <a:blipFill>
-                          <a:blip r:embed="rId3"/>
+                          <a:blip r:embed="rId4"/>
                           <a:stretch>
                             <a:fillRect l="-303125" t="-3846" r="-104688" b="-213462"/>
                           </a:stretch>
@@ -21672,17 +21954,14 @@
                         <a:bodyPr/>
                         <a:lstStyle/>
                         <a:p>
-                          <a:endParaRPr lang="en-US"/>
+                          <a:pPr/>
+                          <a:r>
+                            <a:rPr lang="en-US" dirty="0"/>
+                            <a:t>Iron Man</a:t>
+                          </a:r>
                         </a:p>
                       </a:txBody>
-                      <a:tcPr>
-                        <a:blipFill>
-                          <a:blip r:embed="rId3"/>
-                          <a:stretch>
-                            <a:fillRect l="-403125" t="-3846" r="-4688" b="-213462"/>
-                          </a:stretch>
-                        </a:blipFill>
-                      </a:tcPr>
+                      <a:tcPr/>
                     </a:tc>
                     <a:extLst>
                       <a:ext uri="{0D108BD9-81ED-4DB2-BD59-A6C34878D82A}">
@@ -21698,7 +21977,7 @@
                         <a:p>
                           <a:r>
                             <a:rPr lang="en-US" dirty="0"/>
-                            <a:t>Image 1</a:t>
+                            <a:t>User 1</a:t>
                           </a:r>
                         </a:p>
                       </a:txBody>
@@ -21726,7 +22005,7 @@
                           <a:pPr algn="ctr"/>
                           <a:r>
                             <a:rPr lang="en-US" dirty="0"/>
-                            <a:t>1</a:t>
+                            <a:t>0</a:t>
                           </a:r>
                         </a:p>
                       </a:txBody>
@@ -21742,7 +22021,7 @@
                       </a:txBody>
                       <a:tcPr>
                         <a:blipFill>
-                          <a:blip r:embed="rId3"/>
+                          <a:blip r:embed="rId4"/>
                           <a:stretch>
                             <a:fillRect l="-303125" t="-101887" r="-104688" b="-109434"/>
                           </a:stretch>
@@ -21777,7 +22056,7 @@
                         <a:p>
                           <a:r>
                             <a:rPr lang="en-US" dirty="0"/>
-                            <a:t>Image 2</a:t>
+                            <a:t>User 2</a:t>
                           </a:r>
                         </a:p>
                       </a:txBody>
@@ -21821,7 +22100,7 @@
                       </a:txBody>
                       <a:tcPr>
                         <a:blipFill>
-                          <a:blip r:embed="rId3"/>
+                          <a:blip r:embed="rId4"/>
                           <a:stretch>
                             <a:fillRect l="-303125" t="-205769" r="-104688" b="-11538"/>
                           </a:stretch>
@@ -21836,7 +22115,7 @@
                           <a:pPr algn="ctr"/>
                           <a:r>
                             <a:rPr lang="en-US" dirty="0"/>
-                            <a:t>0</a:t>
+                            <a:t>1</a:t>
                           </a:r>
                         </a:p>
                       </a:txBody>
@@ -22001,7 +22280,7 @@
           <p:cNvPr id="2" name="Rectangle 1">
             <a:extLst>
               <a:ext uri="{FF2B5EF4-FFF2-40B4-BE49-F238E27FC236}">
-                <a16:creationId xmlns:a16="http://schemas.microsoft.com/office/drawing/2014/main" id="{4E5F6E83-3CC8-F59B-162D-60DCF9B9BA54}"/>
+                <a16:creationId xmlns:a16="http://schemas.microsoft.com/office/drawing/2014/main" id="{C55DFB82-435B-0983-87F8-C1330CA8215E}"/>
               </a:ext>
             </a:extLst>
           </p:cNvPr>
@@ -22068,7 +22347,7 @@
           <p:cNvPr id="3" name="Rectangle 2">
             <a:extLst>
               <a:ext uri="{FF2B5EF4-FFF2-40B4-BE49-F238E27FC236}">
-                <a16:creationId xmlns:a16="http://schemas.microsoft.com/office/drawing/2014/main" id="{42C6F8F8-60B1-F97E-AC30-112EF4C76C01}"/>
+                <a16:creationId xmlns:a16="http://schemas.microsoft.com/office/drawing/2014/main" id="{F686D28B-3A7E-66F8-1F7A-5E328CB3DC26}"/>
               </a:ext>
             </a:extLst>
           </p:cNvPr>
@@ -22131,7 +22410,7 @@
                   <a:srgbClr val="000000"/>
                 </a:solidFill>
               </a:rPr>
-              <a:t>What is the Jaccard Similarity between image 1 and image 2?</a:t>
+              <a:t>What is the jaccard similarity between user 1 and user 0?</a:t>
             </a:r>
           </a:p>
         </p:txBody>
@@ -22141,7 +22420,7 @@
           <p:cNvPr id="4" name="Rectangle 3">
             <a:extLst>
               <a:ext uri="{FF2B5EF4-FFF2-40B4-BE49-F238E27FC236}">
-                <a16:creationId xmlns:a16="http://schemas.microsoft.com/office/drawing/2014/main" id="{F8470ECD-5570-15EA-839E-96F4CA45CA18}"/>
+                <a16:creationId xmlns:a16="http://schemas.microsoft.com/office/drawing/2014/main" id="{80B9F1A4-5BE3-4C36-A0C6-037AB939BC8E}"/>
               </a:ext>
             </a:extLst>
           </p:cNvPr>
@@ -22238,7 +22517,7 @@
           <p:cNvPr id="6" name="Graphic 5">
             <a:extLst>
               <a:ext uri="{FF2B5EF4-FFF2-40B4-BE49-F238E27FC236}">
-                <a16:creationId xmlns:a16="http://schemas.microsoft.com/office/drawing/2014/main" id="{0E05D28B-8D88-66AA-C1D4-32EB528D1B9A}"/>
+                <a16:creationId xmlns:a16="http://schemas.microsoft.com/office/drawing/2014/main" id="{108A6CB4-4D10-A9B4-2D3A-5DBDBCF061B1}"/>
               </a:ext>
             </a:extLst>
           </p:cNvPr>
@@ -22274,7 +22553,7 @@
           <p:cNvPr id="7" name="Trapezoid 6">
             <a:extLst>
               <a:ext uri="{FF2B5EF4-FFF2-40B4-BE49-F238E27FC236}">
-                <a16:creationId xmlns:a16="http://schemas.microsoft.com/office/drawing/2014/main" id="{B85A1EF0-28EA-9775-42FF-AEFF3F2E1EE3}"/>
+                <a16:creationId xmlns:a16="http://schemas.microsoft.com/office/drawing/2014/main" id="{6B3C57D2-3C12-699B-3F08-ABC9035AF6F0}"/>
               </a:ext>
             </a:extLst>
           </p:cNvPr>
@@ -22372,7 +22651,7 @@
           <p:cNvPr id="9" name="Graphic 8">
             <a:extLst>
               <a:ext uri="{FF2B5EF4-FFF2-40B4-BE49-F238E27FC236}">
-                <a16:creationId xmlns:a16="http://schemas.microsoft.com/office/drawing/2014/main" id="{498FEE2E-A6D4-230C-B968-D2AC809D6166}"/>
+                <a16:creationId xmlns:a16="http://schemas.microsoft.com/office/drawing/2014/main" id="{D960864A-E813-C59F-E4D1-AE1664B44960}"/>
               </a:ext>
             </a:extLst>
           </p:cNvPr>
@@ -22409,7 +22688,7 @@
     </p:custDataLst>
     <p:extLst>
       <p:ext uri="{BB962C8B-B14F-4D97-AF65-F5344CB8AC3E}">
-        <p14:creationId xmlns:p14="http://schemas.microsoft.com/office/powerpoint/2010/main" val="776818440"/>
+        <p14:creationId xmlns:p14="http://schemas.microsoft.com/office/powerpoint/2010/main" val="487936778"/>
       </p:ext>
     </p:extLst>
   </p:cSld>
@@ -22501,7 +22780,13 @@
   <p:cSld>
     <p:spTree>
       <p:nvGrpSpPr>
-        <p:cNvPr id="1" name=""/>
+        <p:cNvPr id="1" name="">
+          <a:extLst>
+            <a:ext uri="{FF2B5EF4-FFF2-40B4-BE49-F238E27FC236}">
+              <a16:creationId xmlns:a16="http://schemas.microsoft.com/office/drawing/2014/main" id="{4BA983BF-58B8-8136-5D09-8E2D084D42DF}"/>
+            </a:ext>
+          </a:extLst>
+        </p:cNvPr>
         <p:cNvGrpSpPr/>
         <p:nvPr/>
       </p:nvGrpSpPr>
@@ -22518,7 +22803,7 @@
           <p:cNvPr id="2" name="Title 1">
             <a:extLst>
               <a:ext uri="{FF2B5EF4-FFF2-40B4-BE49-F238E27FC236}">
-                <a16:creationId xmlns:a16="http://schemas.microsoft.com/office/drawing/2014/main" id="{0E10596C-87C7-C3AE-DCE1-E5AD592A4FA9}"/>
+                <a16:creationId xmlns:a16="http://schemas.microsoft.com/office/drawing/2014/main" id="{D8D03AC0-F449-8DD3-30AA-4FCD2C616CFE}"/>
               </a:ext>
             </a:extLst>
           </p:cNvPr>
@@ -22536,19 +22821,19 @@
           <a:p>
             <a:r>
               <a:rPr lang="en-US" dirty="0"/>
-              <a:t>Jaccard Similarity (cont.)</a:t>
+              <a:t>Jaccard Similarity Problem</a:t>
             </a:r>
           </a:p>
         </p:txBody>
       </p:sp>
-      <mc:AlternateContent xmlns:mc="http://schemas.openxmlformats.org/markup-compatibility/2006" xmlns:a14="http://schemas.microsoft.com/office/drawing/2010/main">
-        <mc:Choice Requires="a14">
+      <mc:AlternateContent xmlns:mc="http://schemas.openxmlformats.org/markup-compatibility/2006">
+        <mc:Choice xmlns:a14="http://schemas.microsoft.com/office/drawing/2010/main" Requires="a14">
           <p:sp>
             <p:nvSpPr>
               <p:cNvPr id="3" name="Text Placeholder 2">
                 <a:extLst>
                   <a:ext uri="{FF2B5EF4-FFF2-40B4-BE49-F238E27FC236}">
-                    <a16:creationId xmlns:a16="http://schemas.microsoft.com/office/drawing/2014/main" id="{38717880-CC89-7379-9C1B-F4D990E13DC1}"/>
+                    <a16:creationId xmlns:a16="http://schemas.microsoft.com/office/drawing/2014/main" id="{608A5233-B9F2-3F2E-A863-69CC32CEF826}"/>
                   </a:ext>
                 </a:extLst>
               </p:cNvPr>
@@ -22559,45 +22844,181 @@
                 <p:ph type="body" idx="1"/>
               </p:nvPr>
             </p:nvSpPr>
-            <p:spPr/>
+            <p:spPr>
+              <a:xfrm>
+                <a:off x="415600" y="1688433"/>
+                <a:ext cx="11360800" cy="4924240"/>
+              </a:xfrm>
+            </p:spPr>
             <p:txBody>
-              <a:bodyPr/>
+              <a:bodyPr>
+                <a:normAutofit lnSpcReduction="10000"/>
+              </a:bodyPr>
               <a:lstStyle/>
               <a:p>
-                <a:pPr marL="152396" indent="0">
+                <a14:m>
+                  <m:oMath xmlns:m="http://schemas.openxmlformats.org/officeDocument/2006/math">
+                    <m:r>
+                      <a:rPr lang="en-US" b="0" i="1" smtClean="0">
+                        <a:latin typeface="Cambria Math" panose="02040503050406030204" pitchFamily="18" charset="0"/>
+                      </a:rPr>
+                      <m:t>𝐽𝑆𝑖𝑚</m:t>
+                    </m:r>
+                    <m:d>
+                      <m:dPr>
+                        <m:ctrlPr>
+                          <a:rPr lang="en-US" b="0" i="1" smtClean="0">
+                            <a:latin typeface="Cambria Math" panose="02040503050406030204" pitchFamily="18" charset="0"/>
+                          </a:rPr>
+                        </m:ctrlPr>
+                      </m:dPr>
+                      <m:e>
+                        <m:r>
+                          <a:rPr lang="en-US" b="0" i="1" smtClean="0">
+                            <a:latin typeface="Cambria Math" panose="02040503050406030204" pitchFamily="18" charset="0"/>
+                          </a:rPr>
+                          <m:t>𝑥</m:t>
+                        </m:r>
+                        <m:r>
+                          <a:rPr lang="en-US" b="0" i="1" smtClean="0">
+                            <a:latin typeface="Cambria Math" panose="02040503050406030204" pitchFamily="18" charset="0"/>
+                          </a:rPr>
+                          <m:t>,</m:t>
+                        </m:r>
+                        <m:r>
+                          <a:rPr lang="en-US" b="0" i="1" smtClean="0">
+                            <a:latin typeface="Cambria Math" panose="02040503050406030204" pitchFamily="18" charset="0"/>
+                          </a:rPr>
+                          <m:t>𝑦</m:t>
+                        </m:r>
+                      </m:e>
+                    </m:d>
+                    <m:r>
+                      <a:rPr lang="en-US" b="0" i="1" smtClean="0">
+                        <a:latin typeface="Cambria Math" panose="02040503050406030204" pitchFamily="18" charset="0"/>
+                      </a:rPr>
+                      <m:t>=</m:t>
+                    </m:r>
+                    <m:f>
+                      <m:fPr>
+                        <m:ctrlPr>
+                          <a:rPr lang="en-US" b="0" i="1" smtClean="0">
+                            <a:latin typeface="Cambria Math" panose="02040503050406030204" pitchFamily="18" charset="0"/>
+                          </a:rPr>
+                        </m:ctrlPr>
+                      </m:fPr>
+                      <m:num>
+                        <m:d>
+                          <m:dPr>
+                            <m:begChr m:val="|"/>
+                            <m:endChr m:val="|"/>
+                            <m:ctrlPr>
+                              <a:rPr lang="en-US" b="0" i="1" smtClean="0">
+                                <a:latin typeface="Cambria Math" panose="02040503050406030204" pitchFamily="18" charset="0"/>
+                              </a:rPr>
+                            </m:ctrlPr>
+                          </m:dPr>
+                          <m:e>
+                            <m:r>
+                              <a:rPr lang="en-US" b="0" i="1" smtClean="0">
+                                <a:latin typeface="Cambria Math" panose="02040503050406030204" pitchFamily="18" charset="0"/>
+                              </a:rPr>
+                              <m:t>𝑥</m:t>
+                            </m:r>
+                            <m:r>
+                              <a:rPr lang="en-US" b="0" i="1" smtClean="0">
+                                <a:latin typeface="Cambria Math" panose="02040503050406030204" pitchFamily="18" charset="0"/>
+                              </a:rPr>
+                              <m:t>∩</m:t>
+                            </m:r>
+                            <m:r>
+                              <a:rPr lang="en-US" b="0" i="1" smtClean="0">
+                                <a:latin typeface="Cambria Math" panose="02040503050406030204" pitchFamily="18" charset="0"/>
+                              </a:rPr>
+                              <m:t>𝑦</m:t>
+                            </m:r>
+                          </m:e>
+                        </m:d>
+                      </m:num>
+                      <m:den>
+                        <m:d>
+                          <m:dPr>
+                            <m:begChr m:val="|"/>
+                            <m:endChr m:val="|"/>
+                            <m:ctrlPr>
+                              <a:rPr lang="en-US" b="0" i="1" smtClean="0">
+                                <a:latin typeface="Cambria Math" panose="02040503050406030204" pitchFamily="18" charset="0"/>
+                              </a:rPr>
+                            </m:ctrlPr>
+                          </m:dPr>
+                          <m:e>
+                            <m:r>
+                              <a:rPr lang="en-US" b="0" i="1" smtClean="0">
+                                <a:latin typeface="Cambria Math" panose="02040503050406030204" pitchFamily="18" charset="0"/>
+                              </a:rPr>
+                              <m:t>𝑥</m:t>
+                            </m:r>
+                            <m:r>
+                              <a:rPr lang="en-US" b="0" i="1" smtClean="0">
+                                <a:latin typeface="Cambria Math" panose="02040503050406030204" pitchFamily="18" charset="0"/>
+                              </a:rPr>
+                              <m:t>∪</m:t>
+                            </m:r>
+                            <m:r>
+                              <a:rPr lang="en-US" b="0" i="1" smtClean="0">
+                                <a:latin typeface="Cambria Math" panose="02040503050406030204" pitchFamily="18" charset="0"/>
+                              </a:rPr>
+                              <m:t>𝑦</m:t>
+                            </m:r>
+                          </m:e>
+                        </m:d>
+                      </m:den>
+                    </m:f>
+                    <m:r>
+                      <a:rPr lang="en-US" b="0" i="0" smtClean="0">
+                        <a:latin typeface="Cambria Math" panose="02040503050406030204" pitchFamily="18" charset="0"/>
+                      </a:rPr>
+                      <m:t> </m:t>
+                    </m:r>
+                  </m:oMath>
+                </a14:m>
+                <a:endParaRPr lang="en-US" b="0" dirty="0"/>
+              </a:p>
+              <a:p>
+                <a:endParaRPr lang="en-US" dirty="0"/>
+              </a:p>
+              <a:p>
+                <a:endParaRPr lang="en-US" b="0" dirty="0"/>
+              </a:p>
+              <a:p>
+                <a:endParaRPr lang="en-US" dirty="0"/>
+              </a:p>
+              <a:p>
+                <a:endParaRPr lang="en-US" b="0" dirty="0"/>
+              </a:p>
+              <a:p>
+                <a:endParaRPr lang="en-US" dirty="0"/>
+              </a:p>
+              <a:p>
+                <a:endParaRPr lang="en-US" b="0" dirty="0"/>
+              </a:p>
+              <a:p>
+                <a:endParaRPr lang="en-US" dirty="0"/>
+              </a:p>
+              <a:p>
+                <a:pPr marL="795847" lvl="1" indent="0">
                   <a:buNone/>
                 </a:pPr>
                 <a:endParaRPr lang="en-US" dirty="0"/>
               </a:p>
               <a:p>
-                <a:pPr marL="152396" indent="0">
-                  <a:buNone/>
-                </a:pPr>
-                <a:endParaRPr lang="en-US" dirty="0"/>
+                <a:endParaRPr lang="en-US" b="0" dirty="0"/>
               </a:p>
               <a:p>
-                <a:pPr marL="152396" indent="0">
-                  <a:buNone/>
-                </a:pPr>
-                <a:endParaRPr lang="en-US" dirty="0"/>
-              </a:p>
-              <a:p>
-                <a:pPr marL="152396" indent="0">
-                  <a:buNone/>
-                </a:pPr>
-                <a:endParaRPr lang="en-US" dirty="0"/>
-              </a:p>
-              <a:p>
-                <a:pPr marL="152396" indent="0">
-                  <a:buNone/>
-                </a:pPr>
-                <a:endParaRPr lang="en-US" dirty="0"/>
-              </a:p>
-              <a:p>
-                <a:pPr marL="152396" indent="0">
-                  <a:buNone/>
-                </a:pPr>
-                <a:endParaRPr lang="en-US" dirty="0"/>
+                <a:r>
+                  <a:rPr lang="en-US" b="0" dirty="0"/>
+                  <a:t>We are looking for positive occurrences so we will ignore Dune in our calculations. User 1 and user 2 have both watched Star Wars and Iron Man but only one of the users have watched The Matrix and Arrival. </a:t>
+                </a:r>
               </a:p>
               <a:p>
                 <a:pPr marL="152396" indent="0">
@@ -22613,22 +23034,7 @@
                         <a:rPr lang="en-US" b="0" i="1" smtClean="0">
                           <a:latin typeface="Cambria Math" panose="02040503050406030204" pitchFamily="18" charset="0"/>
                         </a:rPr>
-                        <m:t>𝐽</m:t>
-                      </m:r>
-                      <m:r>
-                        <m:rPr>
-                          <m:sty m:val="p"/>
-                        </m:rPr>
-                        <a:rPr lang="en-US" b="0" i="1" smtClean="0">
-                          <a:latin typeface="Cambria Math" panose="02040503050406030204" pitchFamily="18" charset="0"/>
-                        </a:rPr>
-                        <m:t>S</m:t>
-                      </m:r>
-                      <m:r>
-                        <a:rPr lang="en-US" b="0" i="1" smtClean="0">
-                          <a:latin typeface="Cambria Math" panose="02040503050406030204" pitchFamily="18" charset="0"/>
-                        </a:rPr>
-                        <m:t>𝑖𝑚</m:t>
+                        <m:t>𝐽𝑠𝑖𝑚</m:t>
                       </m:r>
                       <m:d>
                         <m:dPr>
@@ -22640,36 +23046,23 @@
                         </m:dPr>
                         <m:e>
                           <m:r>
-                            <a:rPr lang="en-US" b="0" i="1" smtClean="0">
+                            <m:rPr>
+                              <m:nor/>
+                            </m:rPr>
+                            <a:rPr lang="en-US" b="0" i="0" smtClean="0">
                               <a:latin typeface="Cambria Math" panose="02040503050406030204" pitchFamily="18" charset="0"/>
                             </a:rPr>
-                            <m:t>𝐼𝑚𝑎𝑔</m:t>
+                            <m:t>User</m:t>
                           </m:r>
-                          <m:sSub>
-                            <m:sSubPr>
-                              <m:ctrlPr>
-                                <a:rPr lang="en-US" b="0" i="1" smtClean="0">
-                                  <a:latin typeface="Cambria Math" panose="02040503050406030204" pitchFamily="18" charset="0"/>
-                                </a:rPr>
-                              </m:ctrlPr>
-                            </m:sSubPr>
-                            <m:e>
-                              <m:r>
-                                <a:rPr lang="en-US" b="0" i="1" smtClean="0">
-                                  <a:latin typeface="Cambria Math" panose="02040503050406030204" pitchFamily="18" charset="0"/>
-                                </a:rPr>
-                                <m:t>𝑒</m:t>
-                              </m:r>
-                            </m:e>
-                            <m:sub>
-                              <m:r>
-                                <a:rPr lang="en-US" b="0" i="1" smtClean="0">
-                                  <a:latin typeface="Cambria Math" panose="02040503050406030204" pitchFamily="18" charset="0"/>
-                                </a:rPr>
-                                <m:t>1</m:t>
-                              </m:r>
-                            </m:sub>
-                          </m:sSub>
+                          <m:r>
+                            <m:rPr>
+                              <m:nor/>
+                            </m:rPr>
+                            <a:rPr lang="en-US" b="0" i="0" smtClean="0">
+                              <a:latin typeface="Cambria Math" panose="02040503050406030204" pitchFamily="18" charset="0"/>
+                            </a:rPr>
+                            <m:t>1</m:t>
+                          </m:r>
                           <m:r>
                             <a:rPr lang="en-US" b="0" i="1" smtClean="0">
                               <a:latin typeface="Cambria Math" panose="02040503050406030204" pitchFamily="18" charset="0"/>
@@ -22677,38 +23070,56 @@
                             <m:t>,</m:t>
                           </m:r>
                           <m:r>
+                            <m:rPr>
+                              <m:nor/>
+                            </m:rPr>
+                            <a:rPr lang="en-US" b="0" i="0" smtClean="0">
+                              <a:latin typeface="Cambria Math" panose="02040503050406030204" pitchFamily="18" charset="0"/>
+                            </a:rPr>
+                            <m:t>User</m:t>
+                          </m:r>
+                          <m:r>
+                            <m:rPr>
+                              <m:nor/>
+                            </m:rPr>
+                            <a:rPr lang="en-US" b="0" i="0" smtClean="0">
+                              <a:latin typeface="Cambria Math" panose="02040503050406030204" pitchFamily="18" charset="0"/>
+                            </a:rPr>
+                            <m:t>2</m:t>
+                          </m:r>
+                        </m:e>
+                      </m:d>
+                      <m:r>
+                        <a:rPr lang="en-US" b="0" i="1" smtClean="0">
+                          <a:latin typeface="Cambria Math" panose="02040503050406030204" pitchFamily="18" charset="0"/>
+                        </a:rPr>
+                        <m:t>=</m:t>
+                      </m:r>
+                      <m:f>
+                        <m:fPr>
+                          <m:ctrlPr>
                             <a:rPr lang="en-US" b="0" i="1" smtClean="0">
                               <a:latin typeface="Cambria Math" panose="02040503050406030204" pitchFamily="18" charset="0"/>
                             </a:rPr>
-                            <m:t>𝐼𝑚𝑎𝑔</m:t>
+                          </m:ctrlPr>
+                        </m:fPr>
+                        <m:num>
+                          <m:r>
+                            <a:rPr lang="en-US" b="0" i="1" smtClean="0">
+                              <a:latin typeface="Cambria Math" panose="02040503050406030204" pitchFamily="18" charset="0"/>
+                            </a:rPr>
+                            <m:t>2</m:t>
                           </m:r>
-                          <m:sSub>
-                            <m:sSubPr>
-                              <m:ctrlPr>
-                                <a:rPr lang="en-US" b="0" i="1" smtClean="0">
-                                  <a:latin typeface="Cambria Math" panose="02040503050406030204" pitchFamily="18" charset="0"/>
-                                </a:rPr>
-                              </m:ctrlPr>
-                            </m:sSubPr>
-                            <m:e>
-                              <m:r>
-                                <a:rPr lang="en-US" b="0" i="1" smtClean="0">
-                                  <a:latin typeface="Cambria Math" panose="02040503050406030204" pitchFamily="18" charset="0"/>
-                                </a:rPr>
-                                <m:t>𝑒</m:t>
-                              </m:r>
-                            </m:e>
-                            <m:sub>
-                              <m:r>
-                                <a:rPr lang="en-US" b="0" i="1" smtClean="0">
-                                  <a:latin typeface="Cambria Math" panose="02040503050406030204" pitchFamily="18" charset="0"/>
-                                </a:rPr>
-                                <m:t>2</m:t>
-                              </m:r>
-                            </m:sub>
-                          </m:sSub>
-                        </m:e>
-                      </m:d>
+                        </m:num>
+                        <m:den>
+                          <m:r>
+                            <a:rPr lang="en-US" b="0" i="1" smtClean="0">
+                              <a:latin typeface="Cambria Math" panose="02040503050406030204" pitchFamily="18" charset="0"/>
+                            </a:rPr>
+                            <m:t>4</m:t>
+                          </m:r>
+                        </m:den>
+                      </m:f>
                       <m:r>
                         <a:rPr lang="en-US" b="0" i="1" smtClean="0">
                           <a:latin typeface="Cambria Math" panose="02040503050406030204" pitchFamily="18" charset="0"/>
@@ -22736,138 +23147,7 @@
                             <a:rPr lang="en-US" b="0" i="1" smtClean="0">
                               <a:latin typeface="Cambria Math" panose="02040503050406030204" pitchFamily="18" charset="0"/>
                             </a:rPr>
-                            <m:t>4</m:t>
-                          </m:r>
-                        </m:den>
-                      </m:f>
-                    </m:oMath>
-                  </m:oMathPara>
-                </a14:m>
-                <a:endParaRPr lang="en-US" b="0" dirty="0"/>
-              </a:p>
-              <a:p>
-                <a:pPr marL="152396" indent="0">
-                  <a:buNone/>
-                </a:pPr>
-                <a14:m>
-                  <m:oMathPara xmlns:m="http://schemas.openxmlformats.org/officeDocument/2006/math">
-                    <m:oMathParaPr>
-                      <m:jc m:val="centerGroup"/>
-                    </m:oMathParaPr>
-                    <m:oMath xmlns:m="http://schemas.openxmlformats.org/officeDocument/2006/math">
-                      <m:r>
-                        <a:rPr lang="en-US" b="0" i="1" smtClean="0">
-                          <a:latin typeface="Cambria Math" panose="02040503050406030204" pitchFamily="18" charset="0"/>
-                        </a:rPr>
-                        <m:t>𝐽𝐷𝑖𝑠𝑡</m:t>
-                      </m:r>
-                      <m:d>
-                        <m:dPr>
-                          <m:ctrlPr>
-                            <a:rPr lang="en-US" b="0" i="1" smtClean="0">
-                              <a:latin typeface="Cambria Math" panose="02040503050406030204" pitchFamily="18" charset="0"/>
-                            </a:rPr>
-                          </m:ctrlPr>
-                        </m:dPr>
-                        <m:e>
-                          <m:r>
-                            <a:rPr lang="en-US" b="0" i="1" smtClean="0">
-                              <a:latin typeface="Cambria Math" panose="02040503050406030204" pitchFamily="18" charset="0"/>
-                            </a:rPr>
-                            <m:t>𝐼𝑚𝑎𝑔</m:t>
-                          </m:r>
-                          <m:sSub>
-                            <m:sSubPr>
-                              <m:ctrlPr>
-                                <a:rPr lang="en-US" b="0" i="1" smtClean="0">
-                                  <a:latin typeface="Cambria Math" panose="02040503050406030204" pitchFamily="18" charset="0"/>
-                                </a:rPr>
-                              </m:ctrlPr>
-                            </m:sSubPr>
-                            <m:e>
-                              <m:r>
-                                <a:rPr lang="en-US" b="0" i="1" smtClean="0">
-                                  <a:latin typeface="Cambria Math" panose="02040503050406030204" pitchFamily="18" charset="0"/>
-                                </a:rPr>
-                                <m:t>𝑒</m:t>
-                              </m:r>
-                            </m:e>
-                            <m:sub>
-                              <m:r>
-                                <a:rPr lang="en-US" b="0" i="1" smtClean="0">
-                                  <a:latin typeface="Cambria Math" panose="02040503050406030204" pitchFamily="18" charset="0"/>
-                                </a:rPr>
-                                <m:t>1</m:t>
-                              </m:r>
-                            </m:sub>
-                          </m:sSub>
-                          <m:r>
-                            <a:rPr lang="en-US" b="0" i="1" smtClean="0">
-                              <a:latin typeface="Cambria Math" panose="02040503050406030204" pitchFamily="18" charset="0"/>
-                            </a:rPr>
-                            <m:t>,</m:t>
-                          </m:r>
-                          <m:r>
-                            <a:rPr lang="en-US" b="0" i="1" smtClean="0">
-                              <a:latin typeface="Cambria Math" panose="02040503050406030204" pitchFamily="18" charset="0"/>
-                            </a:rPr>
-                            <m:t>𝐼𝑚𝑎𝑔</m:t>
-                          </m:r>
-                          <m:sSub>
-                            <m:sSubPr>
-                              <m:ctrlPr>
-                                <a:rPr lang="en-US" b="0" i="1" smtClean="0">
-                                  <a:latin typeface="Cambria Math" panose="02040503050406030204" pitchFamily="18" charset="0"/>
-                                </a:rPr>
-                              </m:ctrlPr>
-                            </m:sSubPr>
-                            <m:e>
-                              <m:r>
-                                <a:rPr lang="en-US" b="0" i="1" smtClean="0">
-                                  <a:latin typeface="Cambria Math" panose="02040503050406030204" pitchFamily="18" charset="0"/>
-                                </a:rPr>
-                                <m:t>𝑒</m:t>
-                              </m:r>
-                            </m:e>
-                            <m:sub>
-                              <m:r>
-                                <a:rPr lang="en-US" b="0" i="1" smtClean="0">
-                                  <a:latin typeface="Cambria Math" panose="02040503050406030204" pitchFamily="18" charset="0"/>
-                                </a:rPr>
-                                <m:t>2</m:t>
-                              </m:r>
-                            </m:sub>
-                          </m:sSub>
-                        </m:e>
-                      </m:d>
-                      <m:r>
-                        <a:rPr lang="en-US" b="0" i="1" smtClean="0">
-                          <a:latin typeface="Cambria Math" panose="02040503050406030204" pitchFamily="18" charset="0"/>
-                        </a:rPr>
-                        <m:t>=</m:t>
-                      </m:r>
-                      <m:f>
-                        <m:fPr>
-                          <m:ctrlPr>
-                            <a:rPr lang="en-US" b="0" i="1" smtClean="0">
-                              <a:latin typeface="Cambria Math" panose="02040503050406030204" pitchFamily="18" charset="0"/>
-                            </a:rPr>
-                          </m:ctrlPr>
-                        </m:fPr>
-                        <m:num>
-                          <m:r>
-                            <a:rPr lang="en-US" b="0" i="1" smtClean="0">
-                              <a:latin typeface="Cambria Math" panose="02040503050406030204" pitchFamily="18" charset="0"/>
-                            </a:rPr>
-                            <m:t>3</m:t>
-                          </m:r>
-                        </m:num>
-                        <m:den>
-                          <m:r>
-                            <a:rPr lang="en-US" b="0" i="1" smtClean="0">
-                              <a:latin typeface="Cambria Math" panose="02040503050406030204" pitchFamily="18" charset="0"/>
-                            </a:rPr>
-                            <m:t>4</m:t>
+                            <m:t>2</m:t>
                           </m:r>
                         </m:den>
                       </m:f>
@@ -22883,21 +23163,34 @@
                 <a:endParaRPr lang="en-US" b="0" dirty="0"/>
               </a:p>
               <a:p>
+                <a:pPr lvl="1"/>
+                <a:endParaRPr lang="en-US" b="0" dirty="0"/>
+              </a:p>
+              <a:p>
                 <a:pPr marL="152396" indent="0">
                   <a:buNone/>
                 </a:pPr>
+                <a:endParaRPr lang="en-US" b="0" dirty="0"/>
+              </a:p>
+              <a:p>
+                <a:endParaRPr lang="en-US" b="0" dirty="0"/>
+              </a:p>
+              <a:p>
+                <a:endParaRPr lang="en-US" b="0" dirty="0"/>
+              </a:p>
+              <a:p>
                 <a:endParaRPr lang="en-US" dirty="0"/>
               </a:p>
             </p:txBody>
           </p:sp>
         </mc:Choice>
-        <mc:Fallback xmlns="">
+        <mc:Fallback>
           <p:sp>
             <p:nvSpPr>
               <p:cNvPr id="3" name="Text Placeholder 2">
                 <a:extLst>
                   <a:ext uri="{FF2B5EF4-FFF2-40B4-BE49-F238E27FC236}">
-                    <a16:creationId xmlns:a16="http://schemas.microsoft.com/office/drawing/2014/main" id="{38717880-CC89-7379-9C1B-F4D990E13DC1}"/>
+                    <a16:creationId xmlns:a16="http://schemas.microsoft.com/office/drawing/2014/main" id="{608A5233-B9F2-3F2E-A863-69CC32CEF826}"/>
                   </a:ext>
                 </a:extLst>
               </p:cNvPr>
@@ -22909,8 +23202,12 @@
               </p:nvPr>
             </p:nvSpPr>
             <p:spPr>
+              <a:xfrm>
+                <a:off x="415600" y="1688433"/>
+                <a:ext cx="11360800" cy="4924240"/>
+              </a:xfrm>
               <a:blipFill>
-                <a:blip r:embed="rId2"/>
+                <a:blip r:embed="rId3"/>
                 <a:stretch>
                   <a:fillRect/>
                 </a:stretch>
@@ -22931,789 +23228,399 @@
           </p:sp>
         </mc:Fallback>
       </mc:AlternateContent>
-      <mc:AlternateContent xmlns:mc="http://schemas.openxmlformats.org/markup-compatibility/2006" xmlns:a14="http://schemas.microsoft.com/office/drawing/2010/main">
-        <mc:Choice Requires="a14">
-          <p:graphicFrame>
-            <p:nvGraphicFramePr>
-              <p:cNvPr id="4" name="Table 3">
+      <p:graphicFrame>
+        <p:nvGraphicFramePr>
+          <p:cNvPr id="5" name="Table 4">
+            <a:extLst>
+              <a:ext uri="{FF2B5EF4-FFF2-40B4-BE49-F238E27FC236}">
+                <a16:creationId xmlns:a16="http://schemas.microsoft.com/office/drawing/2014/main" id="{55187A98-DDEC-B703-BFAB-6AA33AA06AA6}"/>
+              </a:ext>
+            </a:extLst>
+          </p:cNvPr>
+          <p:cNvGraphicFramePr>
+            <a:graphicFrameLocks noGrp="1"/>
+          </p:cNvGraphicFramePr>
+          <p:nvPr>
+            <p:extLst>
+              <p:ext uri="{D42A27DB-BD31-4B8C-83A1-F6EECF244321}">
+                <p14:modId xmlns:p14="http://schemas.microsoft.com/office/powerpoint/2010/main" val="1589003690"/>
+              </p:ext>
+            </p:extLst>
+          </p:nvPr>
+        </p:nvGraphicFramePr>
+        <p:xfrm>
+          <a:off x="2032000" y="2412558"/>
+          <a:ext cx="8128002" cy="2266125"/>
+        </p:xfrm>
+        <a:graphic>
+          <a:graphicData uri="http://schemas.openxmlformats.org/drawingml/2006/table">
+            <a:tbl>
+              <a:tblPr firstRow="1" bandRow="1">
+                <a:tableStyleId>{D113A9D2-9D6B-4929-AA2D-F23B5EE8CBE7}</a:tableStyleId>
+              </a:tblPr>
+              <a:tblGrid>
+                <a:gridCol w="1354667">
+                  <a:extLst>
+                    <a:ext uri="{9D8B030D-6E8A-4147-A177-3AD203B41FA5}">
+                      <a16:colId xmlns:a16="http://schemas.microsoft.com/office/drawing/2014/main" val="1066441368"/>
+                    </a:ext>
+                  </a:extLst>
+                </a:gridCol>
+                <a:gridCol w="1354667">
+                  <a:extLst>
+                    <a:ext uri="{9D8B030D-6E8A-4147-A177-3AD203B41FA5}">
+                      <a16:colId xmlns:a16="http://schemas.microsoft.com/office/drawing/2014/main" val="3534331178"/>
+                    </a:ext>
+                  </a:extLst>
+                </a:gridCol>
+                <a:gridCol w="1354667">
+                  <a:extLst>
+                    <a:ext uri="{9D8B030D-6E8A-4147-A177-3AD203B41FA5}">
+                      <a16:colId xmlns:a16="http://schemas.microsoft.com/office/drawing/2014/main" val="3257260209"/>
+                    </a:ext>
+                  </a:extLst>
+                </a:gridCol>
+                <a:gridCol w="1354667">
+                  <a:extLst>
+                    <a:ext uri="{9D8B030D-6E8A-4147-A177-3AD203B41FA5}">
+                      <a16:colId xmlns:a16="http://schemas.microsoft.com/office/drawing/2014/main" val="1940356114"/>
+                    </a:ext>
+                  </a:extLst>
+                </a:gridCol>
+                <a:gridCol w="1354667">
+                  <a:extLst>
+                    <a:ext uri="{9D8B030D-6E8A-4147-A177-3AD203B41FA5}">
+                      <a16:colId xmlns:a16="http://schemas.microsoft.com/office/drawing/2014/main" val="2468592987"/>
+                    </a:ext>
+                  </a:extLst>
+                </a:gridCol>
+                <a:gridCol w="1354667">
+                  <a:extLst>
+                    <a:ext uri="{9D8B030D-6E8A-4147-A177-3AD203B41FA5}">
+                      <a16:colId xmlns:a16="http://schemas.microsoft.com/office/drawing/2014/main" val="4068824873"/>
+                    </a:ext>
+                  </a:extLst>
+                </a:gridCol>
+              </a:tblGrid>
+              <a:tr h="370840">
+                <a:tc>
+                  <a:txBody>
+                    <a:bodyPr/>
+                    <a:lstStyle/>
+                    <a:p>
+                      <a:endParaRPr lang="en-US" dirty="0"/>
+                    </a:p>
+                  </a:txBody>
+                  <a:tcPr/>
+                </a:tc>
+                <a:tc>
+                  <a:txBody>
+                    <a:bodyPr/>
+                    <a:lstStyle/>
+                    <a:p>
+                      <a:r>
+                        <a:rPr lang="en-US" b="1" dirty="0"/>
+                        <a:t>The Matrix</a:t>
+                      </a:r>
+                    </a:p>
+                    <a:p>
+                      <a:endParaRPr lang="en-US" dirty="0"/>
+                    </a:p>
+                  </a:txBody>
+                  <a:tcPr/>
+                </a:tc>
+                <a:tc>
+                  <a:txBody>
+                    <a:bodyPr/>
+                    <a:lstStyle/>
+                    <a:p>
+                      <a:r>
+                        <a:rPr lang="en-US" dirty="0"/>
+                        <a:t>Arrival</a:t>
+                      </a:r>
+                    </a:p>
+                  </a:txBody>
+                  <a:tcPr/>
+                </a:tc>
+                <a:tc>
+                  <a:txBody>
+                    <a:bodyPr/>
+                    <a:lstStyle/>
+                    <a:p>
+                      <a:pPr/>
+                      <a:r>
+                        <a:rPr lang="en-US" b="1" dirty="0"/>
+                        <a:t>Dune</a:t>
+                      </a:r>
+                    </a:p>
+                    <a:p>
+                      <a:endParaRPr lang="en-US" dirty="0"/>
+                    </a:p>
+                  </a:txBody>
+                  <a:tcPr/>
+                </a:tc>
+                <a:tc>
+                  <a:txBody>
+                    <a:bodyPr/>
+                    <a:lstStyle/>
+                    <a:p>
+                      <a:r>
+                        <a:rPr lang="en-US" dirty="0"/>
+                        <a:t>Star Wars</a:t>
+                      </a:r>
+                    </a:p>
+                  </a:txBody>
+                  <a:tcPr/>
+                </a:tc>
+                <a:tc>
+                  <a:txBody>
+                    <a:bodyPr/>
+                    <a:lstStyle/>
+                    <a:p>
+                      <a:r>
+                        <a:rPr lang="en-US" dirty="0"/>
+                        <a:t>Iron Man</a:t>
+                      </a:r>
+                    </a:p>
+                  </a:txBody>
+                  <a:tcPr/>
+                </a:tc>
                 <a:extLst>
-                  <a:ext uri="{FF2B5EF4-FFF2-40B4-BE49-F238E27FC236}">
-                    <a16:creationId xmlns:a16="http://schemas.microsoft.com/office/drawing/2014/main" id="{03D5F37E-A801-AB8B-5392-08A160390253}"/>
+                  <a:ext uri="{0D108BD9-81ED-4DB2-BD59-A6C34878D82A}">
+                    <a16:rowId xmlns:a16="http://schemas.microsoft.com/office/drawing/2014/main" val="3124064189"/>
                   </a:ext>
                 </a:extLst>
-              </p:cNvPr>
-              <p:cNvGraphicFramePr>
-                <a:graphicFrameLocks noGrp="1"/>
-              </p:cNvGraphicFramePr>
-              <p:nvPr>
-                <p:extLst>
-                  <p:ext uri="{D42A27DB-BD31-4B8C-83A1-F6EECF244321}">
-                    <p14:modId xmlns:p14="http://schemas.microsoft.com/office/powerpoint/2010/main" val="1584917058"/>
-                  </p:ext>
-                </p:extLst>
-              </p:nvPr>
-            </p:nvGraphicFramePr>
-            <p:xfrm>
-              <a:off x="1915042" y="1731962"/>
-              <a:ext cx="8128000" cy="1697038"/>
-            </p:xfrm>
-            <a:graphic>
-              <a:graphicData uri="http://schemas.openxmlformats.org/drawingml/2006/table">
-                <a:tbl>
-                  <a:tblPr firstRow="1" bandRow="1">
-                    <a:tableStyleId>{D113A9D2-9D6B-4929-AA2D-F23B5EE8CBE7}</a:tableStyleId>
-                  </a:tblPr>
-                  <a:tblGrid>
-                    <a:gridCol w="1625600">
-                      <a:extLst>
-                        <a:ext uri="{9D8B030D-6E8A-4147-A177-3AD203B41FA5}">
-                          <a16:colId xmlns:a16="http://schemas.microsoft.com/office/drawing/2014/main" val="1066441368"/>
-                        </a:ext>
-                      </a:extLst>
-                    </a:gridCol>
-                    <a:gridCol w="1625600">
-                      <a:extLst>
-                        <a:ext uri="{9D8B030D-6E8A-4147-A177-3AD203B41FA5}">
-                          <a16:colId xmlns:a16="http://schemas.microsoft.com/office/drawing/2014/main" val="3534331178"/>
-                        </a:ext>
-                      </a:extLst>
-                    </a:gridCol>
-                    <a:gridCol w="1625600">
-                      <a:extLst>
-                        <a:ext uri="{9D8B030D-6E8A-4147-A177-3AD203B41FA5}">
-                          <a16:colId xmlns:a16="http://schemas.microsoft.com/office/drawing/2014/main" val="3257260209"/>
-                        </a:ext>
-                      </a:extLst>
-                    </a:gridCol>
-                    <a:gridCol w="1625600">
-                      <a:extLst>
-                        <a:ext uri="{9D8B030D-6E8A-4147-A177-3AD203B41FA5}">
-                          <a16:colId xmlns:a16="http://schemas.microsoft.com/office/drawing/2014/main" val="1940356114"/>
-                        </a:ext>
-                      </a:extLst>
-                    </a:gridCol>
-                    <a:gridCol w="1625600">
-                      <a:extLst>
-                        <a:ext uri="{9D8B030D-6E8A-4147-A177-3AD203B41FA5}">
-                          <a16:colId xmlns:a16="http://schemas.microsoft.com/office/drawing/2014/main" val="4068824873"/>
-                        </a:ext>
-                      </a:extLst>
-                    </a:gridCol>
-                  </a:tblGrid>
-                  <a:tr h="370840">
-                    <a:tc>
-                      <a:txBody>
-                        <a:bodyPr/>
-                        <a:lstStyle/>
-                        <a:p>
-                          <a:endParaRPr lang="en-US" dirty="0"/>
-                        </a:p>
-                      </a:txBody>
-                      <a:tcPr/>
-                    </a:tc>
-                    <a:tc>
-                      <a:txBody>
-                        <a:bodyPr/>
-                        <a:lstStyle/>
-                        <a:p>
-                          <a:pPr/>
-                          <a14:m>
-                            <m:oMathPara xmlns:m="http://schemas.openxmlformats.org/officeDocument/2006/math">
-                              <m:oMathParaPr>
-                                <m:jc m:val="centerGroup"/>
-                              </m:oMathParaPr>
-                              <m:oMath xmlns:m="http://schemas.openxmlformats.org/officeDocument/2006/math">
-                                <m:sSub>
-                                  <m:sSubPr>
-                                    <m:ctrlPr>
-                                      <a:rPr lang="en-US" b="1" i="1" smtClean="0">
-                                        <a:latin typeface="Cambria Math" panose="02040503050406030204" pitchFamily="18" charset="0"/>
-                                      </a:rPr>
-                                    </m:ctrlPr>
-                                  </m:sSubPr>
-                                  <m:e>
-                                    <m:r>
-                                      <a:rPr lang="en-US" b="1" i="1" smtClean="0">
-                                        <a:latin typeface="Cambria Math" panose="02040503050406030204" pitchFamily="18" charset="0"/>
-                                      </a:rPr>
-                                      <m:t>𝒑</m:t>
-                                    </m:r>
-                                  </m:e>
-                                  <m:sub>
-                                    <m:r>
-                                      <a:rPr lang="en-US" b="1" i="1" smtClean="0">
-                                        <a:latin typeface="Cambria Math" panose="02040503050406030204" pitchFamily="18" charset="0"/>
-                                      </a:rPr>
-                                      <m:t>𝟏</m:t>
-                                    </m:r>
-                                  </m:sub>
-                                </m:sSub>
-                              </m:oMath>
-                            </m:oMathPara>
-                          </a14:m>
-                          <a:endParaRPr lang="en-US" b="1" dirty="0"/>
-                        </a:p>
-                        <a:p>
-                          <a:endParaRPr lang="en-US" dirty="0"/>
-                        </a:p>
-                      </a:txBody>
-                      <a:tcPr/>
-                    </a:tc>
-                    <a:tc>
-                      <a:txBody>
-                        <a:bodyPr/>
-                        <a:lstStyle/>
-                        <a:p>
-                          <a:pPr/>
-                          <a14:m>
-                            <m:oMathPara xmlns:m="http://schemas.openxmlformats.org/officeDocument/2006/math">
-                              <m:oMathParaPr>
-                                <m:jc m:val="centerGroup"/>
-                              </m:oMathParaPr>
-                              <m:oMath xmlns:m="http://schemas.openxmlformats.org/officeDocument/2006/math">
-                                <m:sSub>
-                                  <m:sSubPr>
-                                    <m:ctrlPr>
-                                      <a:rPr lang="en-US" b="1" i="1" smtClean="0">
-                                        <a:latin typeface="Cambria Math" panose="02040503050406030204" pitchFamily="18" charset="0"/>
-                                      </a:rPr>
-                                    </m:ctrlPr>
-                                  </m:sSubPr>
-                                  <m:e>
-                                    <m:r>
-                                      <a:rPr lang="en-US" b="1" i="1" smtClean="0">
-                                        <a:latin typeface="Cambria Math" panose="02040503050406030204" pitchFamily="18" charset="0"/>
-                                      </a:rPr>
-                                      <m:t>𝒑</m:t>
-                                    </m:r>
-                                  </m:e>
-                                  <m:sub>
-                                    <m:r>
-                                      <a:rPr lang="en-US" b="1" i="1" smtClean="0">
-                                        <a:latin typeface="Cambria Math" panose="02040503050406030204" pitchFamily="18" charset="0"/>
-                                      </a:rPr>
-                                      <m:t>2</m:t>
-                                    </m:r>
-                                  </m:sub>
-                                </m:sSub>
-                              </m:oMath>
-                            </m:oMathPara>
-                          </a14:m>
-                          <a:endParaRPr lang="en-US" dirty="0"/>
-                        </a:p>
-                      </a:txBody>
-                      <a:tcPr/>
-                    </a:tc>
-                    <a:tc>
-                      <a:txBody>
-                        <a:bodyPr/>
-                        <a:lstStyle/>
-                        <a:p>
-                          <a:pPr/>
-                          <a14:m>
-                            <m:oMathPara xmlns:m="http://schemas.openxmlformats.org/officeDocument/2006/math">
-                              <m:oMathParaPr>
-                                <m:jc m:val="centerGroup"/>
-                              </m:oMathParaPr>
-                              <m:oMath xmlns:m="http://schemas.openxmlformats.org/officeDocument/2006/math">
-                                <m:sSub>
-                                  <m:sSubPr>
-                                    <m:ctrlPr>
-                                      <a:rPr lang="en-US" b="1" i="1" smtClean="0">
-                                        <a:latin typeface="Cambria Math" panose="02040503050406030204" pitchFamily="18" charset="0"/>
-                                      </a:rPr>
-                                    </m:ctrlPr>
-                                  </m:sSubPr>
-                                  <m:e>
-                                    <m:r>
-                                      <a:rPr lang="en-US" b="1" i="1" smtClean="0">
-                                        <a:latin typeface="Cambria Math" panose="02040503050406030204" pitchFamily="18" charset="0"/>
-                                      </a:rPr>
-                                      <m:t>𝒑</m:t>
-                                    </m:r>
-                                  </m:e>
-                                  <m:sub>
-                                    <m:r>
-                                      <a:rPr lang="en-US" b="1" i="1" smtClean="0">
-                                        <a:latin typeface="Cambria Math" panose="02040503050406030204" pitchFamily="18" charset="0"/>
-                                      </a:rPr>
-                                      <m:t>𝟑</m:t>
-                                    </m:r>
-                                  </m:sub>
-                                </m:sSub>
-                              </m:oMath>
-                            </m:oMathPara>
-                          </a14:m>
-                          <a:endParaRPr lang="en-US" b="1" dirty="0"/>
-                        </a:p>
-                      </a:txBody>
-                      <a:tcPr/>
-                    </a:tc>
-                    <a:tc>
-                      <a:txBody>
-                        <a:bodyPr/>
-                        <a:lstStyle/>
-                        <a:p>
-                          <a:pPr/>
-                          <a14:m>
-                            <m:oMathPara xmlns:m="http://schemas.openxmlformats.org/officeDocument/2006/math">
-                              <m:oMathParaPr>
-                                <m:jc m:val="centerGroup"/>
-                              </m:oMathParaPr>
-                              <m:oMath xmlns:m="http://schemas.openxmlformats.org/officeDocument/2006/math">
-                                <m:sSub>
-                                  <m:sSubPr>
-                                    <m:ctrlPr>
-                                      <a:rPr lang="en-US" b="1" i="1" smtClean="0">
-                                        <a:latin typeface="Cambria Math" panose="02040503050406030204" pitchFamily="18" charset="0"/>
-                                      </a:rPr>
-                                    </m:ctrlPr>
-                                  </m:sSubPr>
-                                  <m:e>
-                                    <m:r>
-                                      <a:rPr lang="en-US" b="1" i="1" smtClean="0">
-                                        <a:latin typeface="Cambria Math" panose="02040503050406030204" pitchFamily="18" charset="0"/>
-                                      </a:rPr>
-                                      <m:t>𝒑</m:t>
-                                    </m:r>
-                                  </m:e>
-                                  <m:sub>
-                                    <m:r>
-                                      <a:rPr lang="en-US" b="1" i="1" smtClean="0">
-                                        <a:latin typeface="Cambria Math" panose="02040503050406030204" pitchFamily="18" charset="0"/>
-                                      </a:rPr>
-                                      <m:t>4</m:t>
-                                    </m:r>
-                                  </m:sub>
-                                </m:sSub>
-                              </m:oMath>
-                            </m:oMathPara>
-                          </a14:m>
-                          <a:endParaRPr lang="en-US" dirty="0"/>
-                        </a:p>
-                      </a:txBody>
-                      <a:tcPr/>
-                    </a:tc>
-                    <a:extLst>
-                      <a:ext uri="{0D108BD9-81ED-4DB2-BD59-A6C34878D82A}">
-                        <a16:rowId xmlns:a16="http://schemas.microsoft.com/office/drawing/2014/main" val="3124064189"/>
-                      </a:ext>
-                    </a:extLst>
-                  </a:tr>
-                  <a:tr h="370840">
-                    <a:tc>
-                      <a:txBody>
-                        <a:bodyPr/>
-                        <a:lstStyle/>
-                        <a:p>
-                          <a:r>
-                            <a:rPr lang="en-US" dirty="0"/>
-                            <a:t>Image 1</a:t>
-                          </a:r>
-                        </a:p>
-                      </a:txBody>
-                      <a:tcPr/>
-                    </a:tc>
-                    <a:tc>
-                      <a:txBody>
-                        <a:bodyPr/>
-                        <a:lstStyle/>
-                        <a:p>
-                          <a:pPr algn="ctr"/>
-                          <a:r>
-                            <a:rPr lang="en-US" dirty="0"/>
-                            <a:t>1</a:t>
-                          </a:r>
-                        </a:p>
-                      </a:txBody>
-                      <a:tcPr/>
-                    </a:tc>
-                    <a:tc>
-                      <a:txBody>
-                        <a:bodyPr/>
-                        <a:lstStyle/>
-                        <a:p>
-                          <a:pPr algn="ctr"/>
-                          <a:r>
-                            <a:rPr lang="en-US" dirty="0"/>
-                            <a:t>1</a:t>
-                          </a:r>
-                        </a:p>
-                      </a:txBody>
-                      <a:tcPr/>
-                    </a:tc>
-                    <a:tc>
-                      <a:txBody>
-                        <a:bodyPr/>
-                        <a:lstStyle/>
-                        <a:p>
-                          <a:pPr marL="0" marR="0" lvl="0" indent="0" algn="ctr" defTabSz="914400" rtl="0" eaLnBrk="1" fontAlgn="auto" latinLnBrk="0" hangingPunct="1">
-                            <a:lnSpc>
-                              <a:spcPct val="100000"/>
-                            </a:lnSpc>
-                            <a:spcBef>
-                              <a:spcPts val="0"/>
-                            </a:spcBef>
-                            <a:spcAft>
-                              <a:spcPts val="0"/>
-                            </a:spcAft>
-                            <a:buClr>
-                              <a:srgbClr val="000000"/>
-                            </a:buClr>
-                            <a:buSzTx/>
-                            <a:buFont typeface="Arial"/>
-                            <a:buNone/>
-                            <a:tabLst/>
-                            <a:defRPr/>
-                          </a:pPr>
-                          <a:r>
-                            <a:rPr lang="en-US" b="1" dirty="0"/>
-                            <a:t>0</a:t>
-                          </a:r>
-                        </a:p>
-                        <a:p>
-                          <a:endParaRPr lang="en-US" dirty="0"/>
-                        </a:p>
-                      </a:txBody>
-                      <a:tcPr/>
-                    </a:tc>
-                    <a:tc>
-                      <a:txBody>
-                        <a:bodyPr/>
-                        <a:lstStyle/>
-                        <a:p>
-                          <a:pPr algn="ctr"/>
-                          <a:r>
-                            <a:rPr lang="en-US" dirty="0"/>
-                            <a:t>1</a:t>
-                          </a:r>
-                        </a:p>
-                      </a:txBody>
-                      <a:tcPr/>
-                    </a:tc>
-                    <a:extLst>
-                      <a:ext uri="{0D108BD9-81ED-4DB2-BD59-A6C34878D82A}">
-                        <a16:rowId xmlns:a16="http://schemas.microsoft.com/office/drawing/2014/main" val="3395370511"/>
-                      </a:ext>
-                    </a:extLst>
-                  </a:tr>
-                  <a:tr h="370840">
-                    <a:tc>
-                      <a:txBody>
-                        <a:bodyPr/>
-                        <a:lstStyle/>
-                        <a:p>
-                          <a:r>
-                            <a:rPr lang="en-US" dirty="0"/>
-                            <a:t>Image 2</a:t>
-                          </a:r>
-                        </a:p>
-                      </a:txBody>
-                      <a:tcPr/>
-                    </a:tc>
-                    <a:tc>
-                      <a:txBody>
-                        <a:bodyPr/>
-                        <a:lstStyle/>
-                        <a:p>
-                          <a:pPr algn="ctr"/>
-                          <a:r>
-                            <a:rPr lang="en-US" dirty="0"/>
-                            <a:t>0</a:t>
-                          </a:r>
-                        </a:p>
-                      </a:txBody>
-                      <a:tcPr/>
-                    </a:tc>
-                    <a:tc>
-                      <a:txBody>
-                        <a:bodyPr/>
-                        <a:lstStyle/>
-                        <a:p>
-                          <a:pPr algn="ctr"/>
-                          <a:r>
-                            <a:rPr lang="en-US" dirty="0"/>
-                            <a:t>1</a:t>
-                          </a:r>
-                        </a:p>
-                      </a:txBody>
-                      <a:tcPr/>
-                    </a:tc>
-                    <a:tc>
-                      <a:txBody>
-                        <a:bodyPr/>
-                        <a:lstStyle/>
-                        <a:p>
-                          <a:pPr algn="ctr"/>
-                          <a:r>
-                            <a:rPr lang="en-US" dirty="0"/>
-                            <a:t>1</a:t>
-                          </a:r>
-                        </a:p>
-                      </a:txBody>
-                      <a:tcPr/>
-                    </a:tc>
-                    <a:tc>
-                      <a:txBody>
-                        <a:bodyPr/>
-                        <a:lstStyle/>
-                        <a:p>
-                          <a:pPr algn="ctr"/>
-                          <a:r>
-                            <a:rPr lang="en-US" dirty="0"/>
-                            <a:t>0</a:t>
-                          </a:r>
-                        </a:p>
-                      </a:txBody>
-                      <a:tcPr/>
-                    </a:tc>
-                    <a:extLst>
-                      <a:ext uri="{0D108BD9-81ED-4DB2-BD59-A6C34878D82A}">
-                        <a16:rowId xmlns:a16="http://schemas.microsoft.com/office/drawing/2014/main" val="2838850665"/>
-                      </a:ext>
-                    </a:extLst>
-                  </a:tr>
-                </a:tbl>
-              </a:graphicData>
-            </a:graphic>
-          </p:graphicFrame>
-        </mc:Choice>
-        <mc:Fallback xmlns="">
-          <p:graphicFrame>
-            <p:nvGraphicFramePr>
-              <p:cNvPr id="4" name="Table 3">
+              </a:tr>
+              <a:tr h="370840">
+                <a:tc>
+                  <a:txBody>
+                    <a:bodyPr/>
+                    <a:lstStyle/>
+                    <a:p>
+                      <a:r>
+                        <a:rPr lang="en-US" dirty="0"/>
+                        <a:t>User 1</a:t>
+                      </a:r>
+                    </a:p>
+                  </a:txBody>
+                  <a:tcPr/>
+                </a:tc>
+                <a:tc>
+                  <a:txBody>
+                    <a:bodyPr/>
+                    <a:lstStyle/>
+                    <a:p>
+                      <a:pPr algn="ctr"/>
+                      <a:r>
+                        <a:rPr lang="en-US" dirty="0"/>
+                        <a:t>1</a:t>
+                      </a:r>
+                    </a:p>
+                  </a:txBody>
+                  <a:tcPr/>
+                </a:tc>
+                <a:tc>
+                  <a:txBody>
+                    <a:bodyPr/>
+                    <a:lstStyle/>
+                    <a:p>
+                      <a:pPr algn="ctr"/>
+                      <a:r>
+                        <a:rPr lang="en-US" dirty="0"/>
+                        <a:t>0</a:t>
+                      </a:r>
+                    </a:p>
+                  </a:txBody>
+                  <a:tcPr/>
+                </a:tc>
+                <a:tc>
+                  <a:txBody>
+                    <a:bodyPr/>
+                    <a:lstStyle/>
+                    <a:p>
+                      <a:pPr marL="0" marR="0" lvl="0" indent="0" algn="ctr" defTabSz="914400" rtl="0" eaLnBrk="1" fontAlgn="auto" latinLnBrk="0" hangingPunct="1">
+                        <a:lnSpc>
+                          <a:spcPct val="100000"/>
+                        </a:lnSpc>
+                        <a:spcBef>
+                          <a:spcPts val="0"/>
+                        </a:spcBef>
+                        <a:spcAft>
+                          <a:spcPts val="0"/>
+                        </a:spcAft>
+                        <a:buClr>
+                          <a:srgbClr val="000000"/>
+                        </a:buClr>
+                        <a:buSzTx/>
+                        <a:buFont typeface="Arial"/>
+                        <a:buNone/>
+                        <a:tabLst/>
+                        <a:defRPr/>
+                      </a:pPr>
+                      <a:r>
+                        <a:rPr lang="en-US" b="1" dirty="0"/>
+                        <a:t>0</a:t>
+                      </a:r>
+                    </a:p>
+                    <a:p>
+                      <a:endParaRPr lang="en-US" dirty="0"/>
+                    </a:p>
+                  </a:txBody>
+                  <a:tcPr/>
+                </a:tc>
+                <a:tc>
+                  <a:txBody>
+                    <a:bodyPr/>
+                    <a:lstStyle/>
+                    <a:p>
+                      <a:pPr algn="ctr"/>
+                      <a:r>
+                        <a:rPr lang="en-US" dirty="0"/>
+                        <a:t>1</a:t>
+                      </a:r>
+                    </a:p>
+                  </a:txBody>
+                  <a:tcPr/>
+                </a:tc>
+                <a:tc>
+                  <a:txBody>
+                    <a:bodyPr/>
+                    <a:lstStyle/>
+                    <a:p>
+                      <a:pPr algn="ctr"/>
+                      <a:r>
+                        <a:rPr lang="en-US" dirty="0"/>
+                        <a:t>1</a:t>
+                      </a:r>
+                    </a:p>
+                  </a:txBody>
+                  <a:tcPr/>
+                </a:tc>
                 <a:extLst>
-                  <a:ext uri="{FF2B5EF4-FFF2-40B4-BE49-F238E27FC236}">
-                    <a16:creationId xmlns:a16="http://schemas.microsoft.com/office/drawing/2014/main" id="{03D5F37E-A801-AB8B-5392-08A160390253}"/>
+                  <a:ext uri="{0D108BD9-81ED-4DB2-BD59-A6C34878D82A}">
+                    <a16:rowId xmlns:a16="http://schemas.microsoft.com/office/drawing/2014/main" val="3395370511"/>
                   </a:ext>
                 </a:extLst>
-              </p:cNvPr>
-              <p:cNvGraphicFramePr>
-                <a:graphicFrameLocks noGrp="1"/>
-              </p:cNvGraphicFramePr>
-              <p:nvPr>
-                <p:extLst>
-                  <p:ext uri="{D42A27DB-BD31-4B8C-83A1-F6EECF244321}">
-                    <p14:modId xmlns:p14="http://schemas.microsoft.com/office/powerpoint/2010/main" val="1584917058"/>
-                  </p:ext>
-                </p:extLst>
-              </p:nvPr>
-            </p:nvGraphicFramePr>
-            <p:xfrm>
-              <a:off x="1915042" y="1731962"/>
-              <a:ext cx="8128000" cy="1697038"/>
-            </p:xfrm>
-            <a:graphic>
-              <a:graphicData uri="http://schemas.openxmlformats.org/drawingml/2006/table">
-                <a:tbl>
-                  <a:tblPr firstRow="1" bandRow="1">
-                    <a:tableStyleId>{D113A9D2-9D6B-4929-AA2D-F23B5EE8CBE7}</a:tableStyleId>
-                  </a:tblPr>
-                  <a:tblGrid>
-                    <a:gridCol w="1625600">
-                      <a:extLst>
-                        <a:ext uri="{9D8B030D-6E8A-4147-A177-3AD203B41FA5}">
-                          <a16:colId xmlns:a16="http://schemas.microsoft.com/office/drawing/2014/main" val="1066441368"/>
-                        </a:ext>
-                      </a:extLst>
-                    </a:gridCol>
-                    <a:gridCol w="1625600">
-                      <a:extLst>
-                        <a:ext uri="{9D8B030D-6E8A-4147-A177-3AD203B41FA5}">
-                          <a16:colId xmlns:a16="http://schemas.microsoft.com/office/drawing/2014/main" val="3534331178"/>
-                        </a:ext>
-                      </a:extLst>
-                    </a:gridCol>
-                    <a:gridCol w="1625600">
-                      <a:extLst>
-                        <a:ext uri="{9D8B030D-6E8A-4147-A177-3AD203B41FA5}">
-                          <a16:colId xmlns:a16="http://schemas.microsoft.com/office/drawing/2014/main" val="3257260209"/>
-                        </a:ext>
-                      </a:extLst>
-                    </a:gridCol>
-                    <a:gridCol w="1625600">
-                      <a:extLst>
-                        <a:ext uri="{9D8B030D-6E8A-4147-A177-3AD203B41FA5}">
-                          <a16:colId xmlns:a16="http://schemas.microsoft.com/office/drawing/2014/main" val="1940356114"/>
-                        </a:ext>
-                      </a:extLst>
-                    </a:gridCol>
-                    <a:gridCol w="1625600">
-                      <a:extLst>
-                        <a:ext uri="{9D8B030D-6E8A-4147-A177-3AD203B41FA5}">
-                          <a16:colId xmlns:a16="http://schemas.microsoft.com/office/drawing/2014/main" val="4068824873"/>
-                        </a:ext>
-                      </a:extLst>
-                    </a:gridCol>
-                  </a:tblGrid>
-                  <a:tr h="660527">
-                    <a:tc>
-                      <a:txBody>
-                        <a:bodyPr/>
-                        <a:lstStyle/>
-                        <a:p>
-                          <a:endParaRPr lang="en-US" dirty="0"/>
-                        </a:p>
-                      </a:txBody>
-                      <a:tcPr/>
-                    </a:tc>
-                    <a:tc>
-                      <a:txBody>
-                        <a:bodyPr/>
-                        <a:lstStyle/>
-                        <a:p>
-                          <a:endParaRPr lang="en-US"/>
-                        </a:p>
-                      </a:txBody>
-                      <a:tcPr>
-                        <a:blipFill>
-                          <a:blip r:embed="rId3"/>
-                          <a:stretch>
-                            <a:fillRect l="-103125" t="-3846" r="-304688" b="-173077"/>
-                          </a:stretch>
-                        </a:blipFill>
-                      </a:tcPr>
-                    </a:tc>
-                    <a:tc>
-                      <a:txBody>
-                        <a:bodyPr/>
-                        <a:lstStyle/>
-                        <a:p>
-                          <a:endParaRPr lang="en-US"/>
-                        </a:p>
-                      </a:txBody>
-                      <a:tcPr>
-                        <a:blipFill>
-                          <a:blip r:embed="rId3"/>
-                          <a:stretch>
-                            <a:fillRect l="-201550" t="-3846" r="-202326" b="-173077"/>
-                          </a:stretch>
-                        </a:blipFill>
-                      </a:tcPr>
-                    </a:tc>
-                    <a:tc>
-                      <a:txBody>
-                        <a:bodyPr/>
-                        <a:lstStyle/>
-                        <a:p>
-                          <a:endParaRPr lang="en-US"/>
-                        </a:p>
-                      </a:txBody>
-                      <a:tcPr>
-                        <a:blipFill>
-                          <a:blip r:embed="rId3"/>
-                          <a:stretch>
-                            <a:fillRect l="-303906" t="-3846" r="-103906" b="-173077"/>
-                          </a:stretch>
-                        </a:blipFill>
-                      </a:tcPr>
-                    </a:tc>
-                    <a:tc>
-                      <a:txBody>
-                        <a:bodyPr/>
-                        <a:lstStyle/>
-                        <a:p>
-                          <a:endParaRPr lang="en-US"/>
-                        </a:p>
-                      </a:txBody>
-                      <a:tcPr>
-                        <a:blipFill>
-                          <a:blip r:embed="rId3"/>
-                          <a:stretch>
-                            <a:fillRect l="-403906" t="-3846" r="-3906" b="-173077"/>
-                          </a:stretch>
-                        </a:blipFill>
-                      </a:tcPr>
-                    </a:tc>
-                    <a:extLst>
-                      <a:ext uri="{0D108BD9-81ED-4DB2-BD59-A6C34878D82A}">
-                        <a16:rowId xmlns:a16="http://schemas.microsoft.com/office/drawing/2014/main" val="3124064189"/>
-                      </a:ext>
-                    </a:extLst>
-                  </a:tr>
-                  <a:tr h="660527">
-                    <a:tc>
-                      <a:txBody>
-                        <a:bodyPr/>
-                        <a:lstStyle/>
-                        <a:p>
-                          <a:r>
-                            <a:rPr lang="en-US" dirty="0"/>
-                            <a:t>Image 1</a:t>
-                          </a:r>
-                        </a:p>
-                      </a:txBody>
-                      <a:tcPr/>
-                    </a:tc>
-                    <a:tc>
-                      <a:txBody>
-                        <a:bodyPr/>
-                        <a:lstStyle/>
-                        <a:p>
-                          <a:pPr algn="ctr"/>
-                          <a:r>
-                            <a:rPr lang="en-US" dirty="0"/>
-                            <a:t>1</a:t>
-                          </a:r>
-                        </a:p>
-                      </a:txBody>
-                      <a:tcPr/>
-                    </a:tc>
-                    <a:tc>
-                      <a:txBody>
-                        <a:bodyPr/>
-                        <a:lstStyle/>
-                        <a:p>
-                          <a:pPr algn="ctr"/>
-                          <a:r>
-                            <a:rPr lang="en-US" dirty="0"/>
-                            <a:t>1</a:t>
-                          </a:r>
-                        </a:p>
-                      </a:txBody>
-                      <a:tcPr/>
-                    </a:tc>
-                    <a:tc>
-                      <a:txBody>
-                        <a:bodyPr/>
-                        <a:lstStyle/>
-                        <a:p>
-                          <a:pPr marL="0" marR="0" lvl="0" indent="0" algn="ctr" defTabSz="914400" rtl="0" eaLnBrk="1" fontAlgn="auto" latinLnBrk="0" hangingPunct="1">
-                            <a:lnSpc>
-                              <a:spcPct val="100000"/>
-                            </a:lnSpc>
-                            <a:spcBef>
-                              <a:spcPts val="0"/>
-                            </a:spcBef>
-                            <a:spcAft>
-                              <a:spcPts val="0"/>
-                            </a:spcAft>
-                            <a:buClr>
-                              <a:srgbClr val="000000"/>
-                            </a:buClr>
-                            <a:buSzTx/>
-                            <a:buFont typeface="Arial"/>
-                            <a:buNone/>
-                            <a:tabLst/>
-                            <a:defRPr/>
-                          </a:pPr>
-                          <a:r>
-                            <a:rPr lang="en-US" b="1" dirty="0"/>
-                            <a:t>0</a:t>
-                          </a:r>
-                        </a:p>
-                        <a:p>
-                          <a:endParaRPr lang="en-US" dirty="0"/>
-                        </a:p>
-                      </a:txBody>
-                      <a:tcPr/>
-                    </a:tc>
-                    <a:tc>
-                      <a:txBody>
-                        <a:bodyPr/>
-                        <a:lstStyle/>
-                        <a:p>
-                          <a:pPr algn="ctr"/>
-                          <a:r>
-                            <a:rPr lang="en-US" dirty="0"/>
-                            <a:t>1</a:t>
-                          </a:r>
-                        </a:p>
-                      </a:txBody>
-                      <a:tcPr/>
-                    </a:tc>
-                    <a:extLst>
-                      <a:ext uri="{0D108BD9-81ED-4DB2-BD59-A6C34878D82A}">
-                        <a16:rowId xmlns:a16="http://schemas.microsoft.com/office/drawing/2014/main" val="3395370511"/>
-                      </a:ext>
-                    </a:extLst>
-                  </a:tr>
-                  <a:tr h="375984">
-                    <a:tc>
-                      <a:txBody>
-                        <a:bodyPr/>
-                        <a:lstStyle/>
-                        <a:p>
-                          <a:r>
-                            <a:rPr lang="en-US" dirty="0"/>
-                            <a:t>Image 2</a:t>
-                          </a:r>
-                        </a:p>
-                      </a:txBody>
-                      <a:tcPr/>
-                    </a:tc>
-                    <a:tc>
-                      <a:txBody>
-                        <a:bodyPr/>
-                        <a:lstStyle/>
-                        <a:p>
-                          <a:pPr algn="ctr"/>
-                          <a:r>
-                            <a:rPr lang="en-US" dirty="0"/>
-                            <a:t>0</a:t>
-                          </a:r>
-                        </a:p>
-                      </a:txBody>
-                      <a:tcPr/>
-                    </a:tc>
-                    <a:tc>
-                      <a:txBody>
-                        <a:bodyPr/>
-                        <a:lstStyle/>
-                        <a:p>
-                          <a:pPr algn="ctr"/>
-                          <a:r>
-                            <a:rPr lang="en-US" dirty="0"/>
-                            <a:t>1</a:t>
-                          </a:r>
-                        </a:p>
-                      </a:txBody>
-                      <a:tcPr/>
-                    </a:tc>
-                    <a:tc>
-                      <a:txBody>
-                        <a:bodyPr/>
-                        <a:lstStyle/>
-                        <a:p>
-                          <a:pPr algn="ctr"/>
-                          <a:r>
-                            <a:rPr lang="en-US" dirty="0"/>
-                            <a:t>1</a:t>
-                          </a:r>
-                        </a:p>
-                      </a:txBody>
-                      <a:tcPr/>
-                    </a:tc>
-                    <a:tc>
-                      <a:txBody>
-                        <a:bodyPr/>
-                        <a:lstStyle/>
-                        <a:p>
-                          <a:pPr algn="ctr"/>
-                          <a:r>
-                            <a:rPr lang="en-US" dirty="0"/>
-                            <a:t>0</a:t>
-                          </a:r>
-                        </a:p>
-                      </a:txBody>
-                      <a:tcPr/>
-                    </a:tc>
-                    <a:extLst>
-                      <a:ext uri="{0D108BD9-81ED-4DB2-BD59-A6C34878D82A}">
-                        <a16:rowId xmlns:a16="http://schemas.microsoft.com/office/drawing/2014/main" val="2838850665"/>
-                      </a:ext>
-                    </a:extLst>
-                  </a:tr>
-                </a:tbl>
-              </a:graphicData>
-            </a:graphic>
-          </p:graphicFrame>
-        </mc:Fallback>
-      </mc:AlternateContent>
+              </a:tr>
+              <a:tr h="370840">
+                <a:tc>
+                  <a:txBody>
+                    <a:bodyPr/>
+                    <a:lstStyle/>
+                    <a:p>
+                      <a:r>
+                        <a:rPr lang="en-US" dirty="0"/>
+                        <a:t>User 2</a:t>
+                      </a:r>
+                    </a:p>
+                  </a:txBody>
+                  <a:tcPr/>
+                </a:tc>
+                <a:tc>
+                  <a:txBody>
+                    <a:bodyPr/>
+                    <a:lstStyle/>
+                    <a:p>
+                      <a:pPr algn="ctr"/>
+                      <a:r>
+                        <a:rPr lang="en-US" dirty="0"/>
+                        <a:t>0</a:t>
+                      </a:r>
+                    </a:p>
+                  </a:txBody>
+                  <a:tcPr/>
+                </a:tc>
+                <a:tc>
+                  <a:txBody>
+                    <a:bodyPr/>
+                    <a:lstStyle/>
+                    <a:p>
+                      <a:pPr algn="ctr"/>
+                      <a:r>
+                        <a:rPr lang="en-US" dirty="0"/>
+                        <a:t>1</a:t>
+                      </a:r>
+                    </a:p>
+                  </a:txBody>
+                  <a:tcPr/>
+                </a:tc>
+                <a:tc>
+                  <a:txBody>
+                    <a:bodyPr/>
+                    <a:lstStyle/>
+                    <a:p>
+                      <a:pPr marL="0" marR="0" lvl="0" indent="0" algn="ctr" defTabSz="914400" rtl="0" eaLnBrk="1" fontAlgn="auto" latinLnBrk="0" hangingPunct="1">
+                        <a:lnSpc>
+                          <a:spcPct val="100000"/>
+                        </a:lnSpc>
+                        <a:spcBef>
+                          <a:spcPts val="0"/>
+                        </a:spcBef>
+                        <a:spcAft>
+                          <a:spcPts val="0"/>
+                        </a:spcAft>
+                        <a:buClr>
+                          <a:srgbClr val="000000"/>
+                        </a:buClr>
+                        <a:buSzTx/>
+                        <a:buFont typeface="Arial"/>
+                        <a:buNone/>
+                        <a:tabLst/>
+                        <a:defRPr/>
+                      </a:pPr>
+                      <a:r>
+                        <a:rPr lang="en-US" b="1" dirty="0"/>
+                        <a:t>0</a:t>
+                      </a:r>
+                    </a:p>
+                    <a:p>
+                      <a:endParaRPr lang="en-US" dirty="0"/>
+                    </a:p>
+                  </a:txBody>
+                  <a:tcPr/>
+                </a:tc>
+                <a:tc>
+                  <a:txBody>
+                    <a:bodyPr/>
+                    <a:lstStyle/>
+                    <a:p>
+                      <a:pPr algn="ctr"/>
+                      <a:r>
+                        <a:rPr lang="en-US" dirty="0"/>
+                        <a:t>1</a:t>
+                      </a:r>
+                    </a:p>
+                  </a:txBody>
+                  <a:tcPr/>
+                </a:tc>
+                <a:tc>
+                  <a:txBody>
+                    <a:bodyPr/>
+                    <a:lstStyle/>
+                    <a:p>
+                      <a:pPr algn="ctr"/>
+                      <a:r>
+                        <a:rPr lang="en-US" dirty="0"/>
+                        <a:t>1</a:t>
+                      </a:r>
+                    </a:p>
+                  </a:txBody>
+                  <a:tcPr/>
+                </a:tc>
+                <a:extLst>
+                  <a:ext uri="{0D108BD9-81ED-4DB2-BD59-A6C34878D82A}">
+                    <a16:rowId xmlns:a16="http://schemas.microsoft.com/office/drawing/2014/main" val="2838850665"/>
+                  </a:ext>
+                </a:extLst>
+              </a:tr>
+            </a:tbl>
+          </a:graphicData>
+        </a:graphic>
+      </p:graphicFrame>
     </p:spTree>
     <p:extLst>
       <p:ext uri="{BB962C8B-B14F-4D97-AF65-F5344CB8AC3E}">
-        <p14:creationId xmlns:p14="http://schemas.microsoft.com/office/powerpoint/2010/main" val="515137836"/>
+        <p14:creationId xmlns:p14="http://schemas.microsoft.com/office/powerpoint/2010/main" val="3006715100"/>
       </p:ext>
     </p:extLst>
   </p:cSld>
@@ -23770,10 +23677,10 @@
       </p:sp>
       <p:pic>
         <p:nvPicPr>
-          <p:cNvPr id="5" name="Picture 4" descr="A computer screen with text&#10;&#10;AI-generated content may be incorrect.">
+          <p:cNvPr id="4" name="Picture 3" descr="A computer screen with text and numbers&#10;&#10;AI-generated content may be incorrect.">
             <a:extLst>
               <a:ext uri="{FF2B5EF4-FFF2-40B4-BE49-F238E27FC236}">
-                <a16:creationId xmlns:a16="http://schemas.microsoft.com/office/drawing/2014/main" id="{2E9F773A-1E88-31B7-6656-4940CB6D6009}"/>
+                <a16:creationId xmlns:a16="http://schemas.microsoft.com/office/drawing/2014/main" id="{A0D36827-9610-9346-E736-5DBF2304EEDE}"/>
               </a:ext>
             </a:extLst>
           </p:cNvPr>
@@ -23790,8 +23697,8 @@
         </p:blipFill>
         <p:spPr>
           <a:xfrm>
-            <a:off x="1808783" y="2350976"/>
-            <a:ext cx="8574433" cy="2156047"/>
+            <a:off x="1423581" y="1677476"/>
+            <a:ext cx="9344837" cy="3503048"/>
           </a:xfrm>
           <a:prstGeom prst="rect">
             <a:avLst/>
@@ -30193,8 +30100,8 @@
 <file path=ppt/tags/tag8.xml><?xml version="1.0" encoding="utf-8"?>
 <p:tagLst xmlns:a="http://schemas.openxmlformats.org/drawingml/2006/main" xmlns:r="http://schemas.openxmlformats.org/officeDocument/2006/relationships" xmlns:p="http://schemas.openxmlformats.org/presentationml/2006/main">
   <p:tag name="SLIDO_TYPE" val="SlidoPoll"/>
-  <p:tag name="SLIDO_POLL_UUID" val="e395ea99-1add-4e68-9560-45ddf14fbefb"/>
-  <p:tag name="SLIDO_TIMELINE" val="W3sic2hvd0NvcnJlY3RBbnN3ZXJzIjpmYWxzZSwic2hvd1Jlc3VsdHMiOmZhbHNlLCJwb2xsUXVlc3Rpb25VdWlkIjoiNDg3YjY3NjItNmY4MC00OTJhLTg3NGMtNjM2ZDJhNTFiZDllIn0seyJzaG93Q29ycmVjdEFuc3dlcnMiOnRydWUsInNob3dSZXN1bHRzIjp0cnVlLCJwb2xsUXVlc3Rpb25VdWlkIjoiNDg3YjY3NjItNmY4MC00OTJhLTg3NGMtNjM2ZDJhNTFiZDllIn1d"/>
+  <p:tag name="SLIDO_POLL_UUID" val="1c6d483e-2436-4fc7-b0fe-7148acf0176b"/>
+  <p:tag name="SLIDO_TIMELINE" val="W3sicG9sbFF1ZXN0aW9uVXVpZCI6ImE4ZjEzYTdiLWZlOTgtNDc2NC05Y2JkLWE2OWJlMWIzZTRiMiIsInNob3dDb3JyZWN0QW5zd2VycyI6ZmFsc2UsInNob3dSZXN1bHRzIjpmYWxzZX0seyJwb2xsUXVlc3Rpb25VdWlkIjoiYThmMTNhN2ItZmU5OC00NzY0LTljYmQtYTY5YmUxYjNlNGIyIiwic2hvd0NvcnJlY3RBbnN3ZXJzIjp0cnVlLCJzaG93UmVzdWx0cyI6dHJ1ZX1d"/>
 </p:tagLst>
 </file>
 
@@ -30484,4 +30391,319 @@
   <a:objectDefaults/>
   <a:extraClrSchemeLst/>
 </a:theme>
+</file>
+
+<file path=ppt/theme/theme2.xml><?xml version="1.0" encoding="utf-8"?>
+<a:theme xmlns:a="http://schemas.openxmlformats.org/drawingml/2006/main" name="Office Theme">
+  <a:themeElements>
+    <a:clrScheme name="Office">
+      <a:dk1>
+        <a:sysClr val="windowText" lastClr="000000"/>
+      </a:dk1>
+      <a:lt1>
+        <a:sysClr val="window" lastClr="FFFFFF"/>
+      </a:lt1>
+      <a:dk2>
+        <a:srgbClr val="0E2841"/>
+      </a:dk2>
+      <a:lt2>
+        <a:srgbClr val="E8E8E8"/>
+      </a:lt2>
+      <a:accent1>
+        <a:srgbClr val="156082"/>
+      </a:accent1>
+      <a:accent2>
+        <a:srgbClr val="E97132"/>
+      </a:accent2>
+      <a:accent3>
+        <a:srgbClr val="196B24"/>
+      </a:accent3>
+      <a:accent4>
+        <a:srgbClr val="0F9ED5"/>
+      </a:accent4>
+      <a:accent5>
+        <a:srgbClr val="A02B93"/>
+      </a:accent5>
+      <a:accent6>
+        <a:srgbClr val="4EA72E"/>
+      </a:accent6>
+      <a:hlink>
+        <a:srgbClr val="467886"/>
+      </a:hlink>
+      <a:folHlink>
+        <a:srgbClr val="96607D"/>
+      </a:folHlink>
+    </a:clrScheme>
+    <a:fontScheme name="Office">
+      <a:majorFont>
+        <a:latin typeface="Aptos Display" panose="02110004020202020204"/>
+        <a:ea typeface=""/>
+        <a:cs typeface=""/>
+        <a:font script="Jpan" typeface="游ゴシック Light"/>
+        <a:font script="Hang" typeface="맑은 고딕"/>
+        <a:font script="Hans" typeface="等线 Light"/>
+        <a:font script="Hant" typeface="新細明體"/>
+        <a:font script="Arab" typeface="Times New Roman"/>
+        <a:font script="Hebr" typeface="Times New Roman"/>
+        <a:font script="Thai" typeface="Angsana New"/>
+        <a:font script="Ethi" typeface="Nyala"/>
+        <a:font script="Beng" typeface="Vrinda"/>
+        <a:font script="Gujr" typeface="Shruti"/>
+        <a:font script="Khmr" typeface="MoolBoran"/>
+        <a:font script="Knda" typeface="Tunga"/>
+        <a:font script="Guru" typeface="Raavi"/>
+        <a:font script="Cans" typeface="Euphemia"/>
+        <a:font script="Cher" typeface="Plantagenet Cherokee"/>
+        <a:font script="Yiii" typeface="Microsoft Yi Baiti"/>
+        <a:font script="Tibt" typeface="Microsoft Himalaya"/>
+        <a:font script="Thaa" typeface="MV Boli"/>
+        <a:font script="Deva" typeface="Mangal"/>
+        <a:font script="Telu" typeface="Gautami"/>
+        <a:font script="Taml" typeface="Latha"/>
+        <a:font script="Syrc" typeface="Estrangelo Edessa"/>
+        <a:font script="Orya" typeface="Kalinga"/>
+        <a:font script="Mlym" typeface="Kartika"/>
+        <a:font script="Laoo" typeface="DokChampa"/>
+        <a:font script="Sinh" typeface="Iskoola Pota"/>
+        <a:font script="Mong" typeface="Mongolian Baiti"/>
+        <a:font script="Viet" typeface="Times New Roman"/>
+        <a:font script="Uigh" typeface="Microsoft Uighur"/>
+        <a:font script="Geor" typeface="Sylfaen"/>
+        <a:font script="Armn" typeface="Arial"/>
+        <a:font script="Bugi" typeface="Leelawadee UI"/>
+        <a:font script="Bopo" typeface="Microsoft JhengHei"/>
+        <a:font script="Java" typeface="Javanese Text"/>
+        <a:font script="Lisu" typeface="Segoe UI"/>
+        <a:font script="Mymr" typeface="Myanmar Text"/>
+        <a:font script="Nkoo" typeface="Ebrima"/>
+        <a:font script="Olck" typeface="Nirmala UI"/>
+        <a:font script="Osma" typeface="Ebrima"/>
+        <a:font script="Phag" typeface="Phagspa"/>
+        <a:font script="Syrn" typeface="Estrangelo Edessa"/>
+        <a:font script="Syrj" typeface="Estrangelo Edessa"/>
+        <a:font script="Syre" typeface="Estrangelo Edessa"/>
+        <a:font script="Sora" typeface="Nirmala UI"/>
+        <a:font script="Tale" typeface="Microsoft Tai Le"/>
+        <a:font script="Talu" typeface="Microsoft New Tai Lue"/>
+        <a:font script="Tfng" typeface="Ebrima"/>
+      </a:majorFont>
+      <a:minorFont>
+        <a:latin typeface="Aptos" panose="02110004020202020204"/>
+        <a:ea typeface=""/>
+        <a:cs typeface=""/>
+        <a:font script="Jpan" typeface="游ゴシック"/>
+        <a:font script="Hang" typeface="맑은 고딕"/>
+        <a:font script="Hans" typeface="等线"/>
+        <a:font script="Hant" typeface="新細明體"/>
+        <a:font script="Arab" typeface="Arial"/>
+        <a:font script="Hebr" typeface="Arial"/>
+        <a:font script="Thai" typeface="Cordia New"/>
+        <a:font script="Ethi" typeface="Nyala"/>
+        <a:font script="Beng" typeface="Vrinda"/>
+        <a:font script="Gujr" typeface="Shruti"/>
+        <a:font script="Khmr" typeface="DaunPenh"/>
+        <a:font script="Knda" typeface="Tunga"/>
+        <a:font script="Guru" typeface="Raavi"/>
+        <a:font script="Cans" typeface="Euphemia"/>
+        <a:font script="Cher" typeface="Plantagenet Cherokee"/>
+        <a:font script="Yiii" typeface="Microsoft Yi Baiti"/>
+        <a:font script="Tibt" typeface="Microsoft Himalaya"/>
+        <a:font script="Thaa" typeface="MV Boli"/>
+        <a:font script="Deva" typeface="Mangal"/>
+        <a:font script="Telu" typeface="Gautami"/>
+        <a:font script="Taml" typeface="Latha"/>
+        <a:font script="Syrc" typeface="Estrangelo Edessa"/>
+        <a:font script="Orya" typeface="Kalinga"/>
+        <a:font script="Mlym" typeface="Kartika"/>
+        <a:font script="Laoo" typeface="DokChampa"/>
+        <a:font script="Sinh" typeface="Iskoola Pota"/>
+        <a:font script="Mong" typeface="Mongolian Baiti"/>
+        <a:font script="Viet" typeface="Arial"/>
+        <a:font script="Uigh" typeface="Microsoft Uighur"/>
+        <a:font script="Geor" typeface="Sylfaen"/>
+        <a:font script="Armn" typeface="Arial"/>
+        <a:font script="Bugi" typeface="Leelawadee UI"/>
+        <a:font script="Bopo" typeface="Microsoft JhengHei"/>
+        <a:font script="Java" typeface="Javanese Text"/>
+        <a:font script="Lisu" typeface="Segoe UI"/>
+        <a:font script="Mymr" typeface="Myanmar Text"/>
+        <a:font script="Nkoo" typeface="Ebrima"/>
+        <a:font script="Olck" typeface="Nirmala UI"/>
+        <a:font script="Osma" typeface="Ebrima"/>
+        <a:font script="Phag" typeface="Phagspa"/>
+        <a:font script="Syrn" typeface="Estrangelo Edessa"/>
+        <a:font script="Syrj" typeface="Estrangelo Edessa"/>
+        <a:font script="Syre" typeface="Estrangelo Edessa"/>
+        <a:font script="Sora" typeface="Nirmala UI"/>
+        <a:font script="Tale" typeface="Microsoft Tai Le"/>
+        <a:font script="Talu" typeface="Microsoft New Tai Lue"/>
+        <a:font script="Tfng" typeface="Ebrima"/>
+      </a:minorFont>
+    </a:fontScheme>
+    <a:fmtScheme name="Office">
+      <a:fillStyleLst>
+        <a:solidFill>
+          <a:schemeClr val="phClr"/>
+        </a:solidFill>
+        <a:gradFill rotWithShape="1">
+          <a:gsLst>
+            <a:gs pos="0">
+              <a:schemeClr val="phClr">
+                <a:lumMod val="110000"/>
+                <a:satMod val="105000"/>
+                <a:tint val="67000"/>
+              </a:schemeClr>
+            </a:gs>
+            <a:gs pos="50000">
+              <a:schemeClr val="phClr">
+                <a:lumMod val="105000"/>
+                <a:satMod val="103000"/>
+                <a:tint val="73000"/>
+              </a:schemeClr>
+            </a:gs>
+            <a:gs pos="100000">
+              <a:schemeClr val="phClr">
+                <a:lumMod val="105000"/>
+                <a:satMod val="109000"/>
+                <a:tint val="81000"/>
+              </a:schemeClr>
+            </a:gs>
+          </a:gsLst>
+          <a:lin ang="5400000" scaled="0"/>
+        </a:gradFill>
+        <a:gradFill rotWithShape="1">
+          <a:gsLst>
+            <a:gs pos="0">
+              <a:schemeClr val="phClr">
+                <a:satMod val="103000"/>
+                <a:lumMod val="102000"/>
+                <a:tint val="94000"/>
+              </a:schemeClr>
+            </a:gs>
+            <a:gs pos="50000">
+              <a:schemeClr val="phClr">
+                <a:satMod val="110000"/>
+                <a:lumMod val="100000"/>
+                <a:shade val="100000"/>
+              </a:schemeClr>
+            </a:gs>
+            <a:gs pos="100000">
+              <a:schemeClr val="phClr">
+                <a:lumMod val="99000"/>
+                <a:satMod val="120000"/>
+                <a:shade val="78000"/>
+              </a:schemeClr>
+            </a:gs>
+          </a:gsLst>
+          <a:lin ang="5400000" scaled="0"/>
+        </a:gradFill>
+      </a:fillStyleLst>
+      <a:lnStyleLst>
+        <a:ln w="12700" cap="flat" cmpd="sng" algn="ctr">
+          <a:solidFill>
+            <a:schemeClr val="phClr"/>
+          </a:solidFill>
+          <a:prstDash val="solid"/>
+          <a:miter lim="800000"/>
+        </a:ln>
+        <a:ln w="19050" cap="flat" cmpd="sng" algn="ctr">
+          <a:solidFill>
+            <a:schemeClr val="phClr"/>
+          </a:solidFill>
+          <a:prstDash val="solid"/>
+          <a:miter lim="800000"/>
+        </a:ln>
+        <a:ln w="25400" cap="flat" cmpd="sng" algn="ctr">
+          <a:solidFill>
+            <a:schemeClr val="phClr"/>
+          </a:solidFill>
+          <a:prstDash val="solid"/>
+          <a:miter lim="800000"/>
+        </a:ln>
+      </a:lnStyleLst>
+      <a:effectStyleLst>
+        <a:effectStyle>
+          <a:effectLst/>
+        </a:effectStyle>
+        <a:effectStyle>
+          <a:effectLst/>
+        </a:effectStyle>
+        <a:effectStyle>
+          <a:effectLst>
+            <a:outerShdw blurRad="57150" dist="19050" dir="5400000" algn="ctr" rotWithShape="0">
+              <a:srgbClr val="000000">
+                <a:alpha val="63000"/>
+              </a:srgbClr>
+            </a:outerShdw>
+          </a:effectLst>
+        </a:effectStyle>
+      </a:effectStyleLst>
+      <a:bgFillStyleLst>
+        <a:solidFill>
+          <a:schemeClr val="phClr"/>
+        </a:solidFill>
+        <a:solidFill>
+          <a:schemeClr val="phClr">
+            <a:tint val="95000"/>
+            <a:satMod val="170000"/>
+          </a:schemeClr>
+        </a:solidFill>
+        <a:gradFill rotWithShape="1">
+          <a:gsLst>
+            <a:gs pos="0">
+              <a:schemeClr val="phClr">
+                <a:tint val="93000"/>
+                <a:satMod val="150000"/>
+                <a:shade val="98000"/>
+                <a:lumMod val="102000"/>
+              </a:schemeClr>
+            </a:gs>
+            <a:gs pos="50000">
+              <a:schemeClr val="phClr">
+                <a:tint val="98000"/>
+                <a:satMod val="130000"/>
+                <a:shade val="90000"/>
+                <a:lumMod val="103000"/>
+              </a:schemeClr>
+            </a:gs>
+            <a:gs pos="100000">
+              <a:schemeClr val="phClr">
+                <a:shade val="63000"/>
+                <a:satMod val="120000"/>
+              </a:schemeClr>
+            </a:gs>
+          </a:gsLst>
+          <a:lin ang="5400000" scaled="0"/>
+        </a:gradFill>
+      </a:bgFillStyleLst>
+    </a:fmtScheme>
+  </a:themeElements>
+  <a:objectDefaults>
+    <a:lnDef>
+      <a:spPr/>
+      <a:bodyPr/>
+      <a:lstStyle/>
+      <a:style>
+        <a:lnRef idx="2">
+          <a:schemeClr val="accent1"/>
+        </a:lnRef>
+        <a:fillRef idx="0">
+          <a:schemeClr val="accent1"/>
+        </a:fillRef>
+        <a:effectRef idx="1">
+          <a:schemeClr val="accent1"/>
+        </a:effectRef>
+        <a:fontRef idx="minor">
+          <a:schemeClr val="tx1"/>
+        </a:fontRef>
+      </a:style>
+    </a:lnDef>
+  </a:objectDefaults>
+  <a:extraClrSchemeLst/>
+  <a:extLst>
+    <a:ext uri="{05A4C25C-085E-4340-85A3-A5531E510DB2}">
+      <thm15:themeFamily xmlns:thm15="http://schemas.microsoft.com/office/thememl/2012/main" name="Office Theme" id="{2E142A2C-CD16-42D6-873A-C26D2A0506FA}" vid="{1BDDFF52-6CD6-40A5-AB3C-68EB2F1E4D0A}"/>
+    </a:ext>
+  </a:extLst>
+</a:theme>
 </file>
</xml_diff>